<commit_message>
Added business needs, multi-region set-up and other verbiage edits.
</commit_message>
<xml_diff>
--- a/HowTos/Anonymous_Browsing_media/Anonymous Browsing.pptx
+++ b/HowTos/Anonymous_Browsing_media/Anonymous Browsing.pptx
@@ -138,7 +138,7 @@
           <p:cNvPr id="2" name="Title 1">
             <a:extLst>
               <a:ext uri="{FF2B5EF4-FFF2-40B4-BE49-F238E27FC236}">
-                <a16:creationId xmlns:a16="http://schemas.microsoft.com/office/drawing/2014/main" id="{01B8B9D0-A4BC-4ABC-BD92-8F3B7555CDA9}"/>
+                <a16:creationId xmlns:a16="http://schemas.microsoft.com/office/drawing/2014/main" xmlns="" id="{01B8B9D0-A4BC-4ABC-BD92-8F3B7555CDA9}"/>
               </a:ext>
             </a:extLst>
           </p:cNvPr>
@@ -175,7 +175,7 @@
           <p:cNvPr id="3" name="Subtitle 2">
             <a:extLst>
               <a:ext uri="{FF2B5EF4-FFF2-40B4-BE49-F238E27FC236}">
-                <a16:creationId xmlns:a16="http://schemas.microsoft.com/office/drawing/2014/main" id="{17FC655D-4DB6-4CB5-9B8A-F6D7D8A96ABC}"/>
+                <a16:creationId xmlns:a16="http://schemas.microsoft.com/office/drawing/2014/main" xmlns="" id="{17FC655D-4DB6-4CB5-9B8A-F6D7D8A96ABC}"/>
               </a:ext>
             </a:extLst>
           </p:cNvPr>
@@ -245,7 +245,7 @@
           <p:cNvPr id="4" name="Date Placeholder 3">
             <a:extLst>
               <a:ext uri="{FF2B5EF4-FFF2-40B4-BE49-F238E27FC236}">
-                <a16:creationId xmlns:a16="http://schemas.microsoft.com/office/drawing/2014/main" id="{A7920911-2E4C-4AAE-B104-188304748D83}"/>
+                <a16:creationId xmlns:a16="http://schemas.microsoft.com/office/drawing/2014/main" xmlns="" id="{A7920911-2E4C-4AAE-B104-188304748D83}"/>
               </a:ext>
             </a:extLst>
           </p:cNvPr>
@@ -263,7 +263,7 @@
           <a:p>
             <a:fld id="{38711518-FC91-48DB-9CD3-4268B4CCA569}" type="datetimeFigureOut">
               <a:rPr lang="en-US" smtClean="0"/>
-              <a:t>9/21/2017</a:t>
+              <a:t>10/1/17</a:t>
             </a:fld>
             <a:endParaRPr lang="en-US"/>
           </a:p>
@@ -274,7 +274,7 @@
           <p:cNvPr id="5" name="Footer Placeholder 4">
             <a:extLst>
               <a:ext uri="{FF2B5EF4-FFF2-40B4-BE49-F238E27FC236}">
-                <a16:creationId xmlns:a16="http://schemas.microsoft.com/office/drawing/2014/main" id="{9757E704-7458-46B4-B322-0E16CA5C9BD3}"/>
+                <a16:creationId xmlns:a16="http://schemas.microsoft.com/office/drawing/2014/main" xmlns="" id="{9757E704-7458-46B4-B322-0E16CA5C9BD3}"/>
               </a:ext>
             </a:extLst>
           </p:cNvPr>
@@ -299,7 +299,7 @@
           <p:cNvPr id="6" name="Slide Number Placeholder 5">
             <a:extLst>
               <a:ext uri="{FF2B5EF4-FFF2-40B4-BE49-F238E27FC236}">
-                <a16:creationId xmlns:a16="http://schemas.microsoft.com/office/drawing/2014/main" id="{6DF043E5-505C-4A12-BF04-C09A69785874}"/>
+                <a16:creationId xmlns:a16="http://schemas.microsoft.com/office/drawing/2014/main" xmlns="" id="{6DF043E5-505C-4A12-BF04-C09A69785874}"/>
               </a:ext>
             </a:extLst>
           </p:cNvPr>
@@ -358,7 +358,7 @@
           <p:cNvPr id="2" name="Title 1">
             <a:extLst>
               <a:ext uri="{FF2B5EF4-FFF2-40B4-BE49-F238E27FC236}">
-                <a16:creationId xmlns:a16="http://schemas.microsoft.com/office/drawing/2014/main" id="{D8E04B55-0D1B-42E9-954E-1E4757C11F0D}"/>
+                <a16:creationId xmlns:a16="http://schemas.microsoft.com/office/drawing/2014/main" xmlns="" id="{D8E04B55-0D1B-42E9-954E-1E4757C11F0D}"/>
               </a:ext>
             </a:extLst>
           </p:cNvPr>
@@ -386,7 +386,7 @@
           <p:cNvPr id="3" name="Vertical Text Placeholder 2">
             <a:extLst>
               <a:ext uri="{FF2B5EF4-FFF2-40B4-BE49-F238E27FC236}">
-                <a16:creationId xmlns:a16="http://schemas.microsoft.com/office/drawing/2014/main" id="{30563874-78D6-4B9B-9D0E-6962ED344D66}"/>
+                <a16:creationId xmlns:a16="http://schemas.microsoft.com/office/drawing/2014/main" xmlns="" id="{30563874-78D6-4B9B-9D0E-6962ED344D66}"/>
               </a:ext>
             </a:extLst>
           </p:cNvPr>
@@ -443,7 +443,7 @@
           <p:cNvPr id="4" name="Date Placeholder 3">
             <a:extLst>
               <a:ext uri="{FF2B5EF4-FFF2-40B4-BE49-F238E27FC236}">
-                <a16:creationId xmlns:a16="http://schemas.microsoft.com/office/drawing/2014/main" id="{B702E47A-7B53-441F-9103-95EC65CEBCBD}"/>
+                <a16:creationId xmlns:a16="http://schemas.microsoft.com/office/drawing/2014/main" xmlns="" id="{B702E47A-7B53-441F-9103-95EC65CEBCBD}"/>
               </a:ext>
             </a:extLst>
           </p:cNvPr>
@@ -461,7 +461,7 @@
           <a:p>
             <a:fld id="{38711518-FC91-48DB-9CD3-4268B4CCA569}" type="datetimeFigureOut">
               <a:rPr lang="en-US" smtClean="0"/>
-              <a:t>9/21/2017</a:t>
+              <a:t>10/1/17</a:t>
             </a:fld>
             <a:endParaRPr lang="en-US"/>
           </a:p>
@@ -472,7 +472,7 @@
           <p:cNvPr id="5" name="Footer Placeholder 4">
             <a:extLst>
               <a:ext uri="{FF2B5EF4-FFF2-40B4-BE49-F238E27FC236}">
-                <a16:creationId xmlns:a16="http://schemas.microsoft.com/office/drawing/2014/main" id="{C8E9844C-9935-49C1-B5DF-4D4B699AAE8F}"/>
+                <a16:creationId xmlns:a16="http://schemas.microsoft.com/office/drawing/2014/main" xmlns="" id="{C8E9844C-9935-49C1-B5DF-4D4B699AAE8F}"/>
               </a:ext>
             </a:extLst>
           </p:cNvPr>
@@ -497,7 +497,7 @@
           <p:cNvPr id="6" name="Slide Number Placeholder 5">
             <a:extLst>
               <a:ext uri="{FF2B5EF4-FFF2-40B4-BE49-F238E27FC236}">
-                <a16:creationId xmlns:a16="http://schemas.microsoft.com/office/drawing/2014/main" id="{85F1C8D6-E090-4B41-80D8-24815E7921DE}"/>
+                <a16:creationId xmlns:a16="http://schemas.microsoft.com/office/drawing/2014/main" xmlns="" id="{85F1C8D6-E090-4B41-80D8-24815E7921DE}"/>
               </a:ext>
             </a:extLst>
           </p:cNvPr>
@@ -556,7 +556,7 @@
           <p:cNvPr id="2" name="Vertical Title 1">
             <a:extLst>
               <a:ext uri="{FF2B5EF4-FFF2-40B4-BE49-F238E27FC236}">
-                <a16:creationId xmlns:a16="http://schemas.microsoft.com/office/drawing/2014/main" id="{D6C55CE9-859C-4DB3-B33C-C9C4A2351872}"/>
+                <a16:creationId xmlns:a16="http://schemas.microsoft.com/office/drawing/2014/main" xmlns="" id="{D6C55CE9-859C-4DB3-B33C-C9C4A2351872}"/>
               </a:ext>
             </a:extLst>
           </p:cNvPr>
@@ -589,7 +589,7 @@
           <p:cNvPr id="3" name="Vertical Text Placeholder 2">
             <a:extLst>
               <a:ext uri="{FF2B5EF4-FFF2-40B4-BE49-F238E27FC236}">
-                <a16:creationId xmlns:a16="http://schemas.microsoft.com/office/drawing/2014/main" id="{D818FB9C-1822-4693-9ACB-53D7484936FB}"/>
+                <a16:creationId xmlns:a16="http://schemas.microsoft.com/office/drawing/2014/main" xmlns="" id="{D818FB9C-1822-4693-9ACB-53D7484936FB}"/>
               </a:ext>
             </a:extLst>
           </p:cNvPr>
@@ -651,7 +651,7 @@
           <p:cNvPr id="4" name="Date Placeholder 3">
             <a:extLst>
               <a:ext uri="{FF2B5EF4-FFF2-40B4-BE49-F238E27FC236}">
-                <a16:creationId xmlns:a16="http://schemas.microsoft.com/office/drawing/2014/main" id="{C76D3215-31E5-405F-8E51-059FC301285C}"/>
+                <a16:creationId xmlns:a16="http://schemas.microsoft.com/office/drawing/2014/main" xmlns="" id="{C76D3215-31E5-405F-8E51-059FC301285C}"/>
               </a:ext>
             </a:extLst>
           </p:cNvPr>
@@ -669,7 +669,7 @@
           <a:p>
             <a:fld id="{38711518-FC91-48DB-9CD3-4268B4CCA569}" type="datetimeFigureOut">
               <a:rPr lang="en-US" smtClean="0"/>
-              <a:t>9/21/2017</a:t>
+              <a:t>10/1/17</a:t>
             </a:fld>
             <a:endParaRPr lang="en-US"/>
           </a:p>
@@ -680,7 +680,7 @@
           <p:cNvPr id="5" name="Footer Placeholder 4">
             <a:extLst>
               <a:ext uri="{FF2B5EF4-FFF2-40B4-BE49-F238E27FC236}">
-                <a16:creationId xmlns:a16="http://schemas.microsoft.com/office/drawing/2014/main" id="{D9EC14EA-1E56-4824-9D6F-101B87E10297}"/>
+                <a16:creationId xmlns:a16="http://schemas.microsoft.com/office/drawing/2014/main" xmlns="" id="{D9EC14EA-1E56-4824-9D6F-101B87E10297}"/>
               </a:ext>
             </a:extLst>
           </p:cNvPr>
@@ -705,7 +705,7 @@
           <p:cNvPr id="6" name="Slide Number Placeholder 5">
             <a:extLst>
               <a:ext uri="{FF2B5EF4-FFF2-40B4-BE49-F238E27FC236}">
-                <a16:creationId xmlns:a16="http://schemas.microsoft.com/office/drawing/2014/main" id="{E2556C73-31FC-438B-9A54-52C524472914}"/>
+                <a16:creationId xmlns:a16="http://schemas.microsoft.com/office/drawing/2014/main" xmlns="" id="{E2556C73-31FC-438B-9A54-52C524472914}"/>
               </a:ext>
             </a:extLst>
           </p:cNvPr>
@@ -764,7 +764,7 @@
           <p:cNvPr id="2" name="Title 1">
             <a:extLst>
               <a:ext uri="{FF2B5EF4-FFF2-40B4-BE49-F238E27FC236}">
-                <a16:creationId xmlns:a16="http://schemas.microsoft.com/office/drawing/2014/main" id="{2AEE1888-FC41-4BDE-BEB4-F78D35107E76}"/>
+                <a16:creationId xmlns:a16="http://schemas.microsoft.com/office/drawing/2014/main" xmlns="" id="{2AEE1888-FC41-4BDE-BEB4-F78D35107E76}"/>
               </a:ext>
             </a:extLst>
           </p:cNvPr>
@@ -792,7 +792,7 @@
           <p:cNvPr id="3" name="Content Placeholder 2">
             <a:extLst>
               <a:ext uri="{FF2B5EF4-FFF2-40B4-BE49-F238E27FC236}">
-                <a16:creationId xmlns:a16="http://schemas.microsoft.com/office/drawing/2014/main" id="{434D03A4-FCD9-49C2-96DB-B55210C56E03}"/>
+                <a16:creationId xmlns:a16="http://schemas.microsoft.com/office/drawing/2014/main" xmlns="" id="{434D03A4-FCD9-49C2-96DB-B55210C56E03}"/>
               </a:ext>
             </a:extLst>
           </p:cNvPr>
@@ -849,7 +849,7 @@
           <p:cNvPr id="4" name="Date Placeholder 3">
             <a:extLst>
               <a:ext uri="{FF2B5EF4-FFF2-40B4-BE49-F238E27FC236}">
-                <a16:creationId xmlns:a16="http://schemas.microsoft.com/office/drawing/2014/main" id="{DFB9A816-CB2A-4DD0-9601-0A2453AA367D}"/>
+                <a16:creationId xmlns:a16="http://schemas.microsoft.com/office/drawing/2014/main" xmlns="" id="{DFB9A816-CB2A-4DD0-9601-0A2453AA367D}"/>
               </a:ext>
             </a:extLst>
           </p:cNvPr>
@@ -867,7 +867,7 @@
           <a:p>
             <a:fld id="{38711518-FC91-48DB-9CD3-4268B4CCA569}" type="datetimeFigureOut">
               <a:rPr lang="en-US" smtClean="0"/>
-              <a:t>9/21/2017</a:t>
+              <a:t>10/1/17</a:t>
             </a:fld>
             <a:endParaRPr lang="en-US"/>
           </a:p>
@@ -878,7 +878,7 @@
           <p:cNvPr id="5" name="Footer Placeholder 4">
             <a:extLst>
               <a:ext uri="{FF2B5EF4-FFF2-40B4-BE49-F238E27FC236}">
-                <a16:creationId xmlns:a16="http://schemas.microsoft.com/office/drawing/2014/main" id="{5054F8A5-BCF2-4F34-8CAA-E7F6B43B5D0D}"/>
+                <a16:creationId xmlns:a16="http://schemas.microsoft.com/office/drawing/2014/main" xmlns="" id="{5054F8A5-BCF2-4F34-8CAA-E7F6B43B5D0D}"/>
               </a:ext>
             </a:extLst>
           </p:cNvPr>
@@ -903,7 +903,7 @@
           <p:cNvPr id="6" name="Slide Number Placeholder 5">
             <a:extLst>
               <a:ext uri="{FF2B5EF4-FFF2-40B4-BE49-F238E27FC236}">
-                <a16:creationId xmlns:a16="http://schemas.microsoft.com/office/drawing/2014/main" id="{B407A1AC-DE11-4B0B-91D1-61B56C4601B3}"/>
+                <a16:creationId xmlns:a16="http://schemas.microsoft.com/office/drawing/2014/main" xmlns="" id="{B407A1AC-DE11-4B0B-91D1-61B56C4601B3}"/>
               </a:ext>
             </a:extLst>
           </p:cNvPr>
@@ -962,7 +962,7 @@
           <p:cNvPr id="2" name="Title 1">
             <a:extLst>
               <a:ext uri="{FF2B5EF4-FFF2-40B4-BE49-F238E27FC236}">
-                <a16:creationId xmlns:a16="http://schemas.microsoft.com/office/drawing/2014/main" id="{3AB9E91C-A201-43AD-A12F-1C766BF217B8}"/>
+                <a16:creationId xmlns:a16="http://schemas.microsoft.com/office/drawing/2014/main" xmlns="" id="{3AB9E91C-A201-43AD-A12F-1C766BF217B8}"/>
               </a:ext>
             </a:extLst>
           </p:cNvPr>
@@ -999,7 +999,7 @@
           <p:cNvPr id="3" name="Text Placeholder 2">
             <a:extLst>
               <a:ext uri="{FF2B5EF4-FFF2-40B4-BE49-F238E27FC236}">
-                <a16:creationId xmlns:a16="http://schemas.microsoft.com/office/drawing/2014/main" id="{4910DBDD-C1CA-475C-8C0F-722ADDDDECDC}"/>
+                <a16:creationId xmlns:a16="http://schemas.microsoft.com/office/drawing/2014/main" xmlns="" id="{4910DBDD-C1CA-475C-8C0F-722ADDDDECDC}"/>
               </a:ext>
             </a:extLst>
           </p:cNvPr>
@@ -1124,7 +1124,7 @@
           <p:cNvPr id="4" name="Date Placeholder 3">
             <a:extLst>
               <a:ext uri="{FF2B5EF4-FFF2-40B4-BE49-F238E27FC236}">
-                <a16:creationId xmlns:a16="http://schemas.microsoft.com/office/drawing/2014/main" id="{57DF713E-DD4C-4EB5-8DC7-41F7E1951588}"/>
+                <a16:creationId xmlns:a16="http://schemas.microsoft.com/office/drawing/2014/main" xmlns="" id="{57DF713E-DD4C-4EB5-8DC7-41F7E1951588}"/>
               </a:ext>
             </a:extLst>
           </p:cNvPr>
@@ -1142,7 +1142,7 @@
           <a:p>
             <a:fld id="{38711518-FC91-48DB-9CD3-4268B4CCA569}" type="datetimeFigureOut">
               <a:rPr lang="en-US" smtClean="0"/>
-              <a:t>9/21/2017</a:t>
+              <a:t>10/1/17</a:t>
             </a:fld>
             <a:endParaRPr lang="en-US"/>
           </a:p>
@@ -1153,7 +1153,7 @@
           <p:cNvPr id="5" name="Footer Placeholder 4">
             <a:extLst>
               <a:ext uri="{FF2B5EF4-FFF2-40B4-BE49-F238E27FC236}">
-                <a16:creationId xmlns:a16="http://schemas.microsoft.com/office/drawing/2014/main" id="{97FC9A70-6D90-4AD6-BE96-73854A0EEA1F}"/>
+                <a16:creationId xmlns:a16="http://schemas.microsoft.com/office/drawing/2014/main" xmlns="" id="{97FC9A70-6D90-4AD6-BE96-73854A0EEA1F}"/>
               </a:ext>
             </a:extLst>
           </p:cNvPr>
@@ -1178,7 +1178,7 @@
           <p:cNvPr id="6" name="Slide Number Placeholder 5">
             <a:extLst>
               <a:ext uri="{FF2B5EF4-FFF2-40B4-BE49-F238E27FC236}">
-                <a16:creationId xmlns:a16="http://schemas.microsoft.com/office/drawing/2014/main" id="{CF54485E-D39A-4E76-8B5F-B5445813E143}"/>
+                <a16:creationId xmlns:a16="http://schemas.microsoft.com/office/drawing/2014/main" xmlns="" id="{CF54485E-D39A-4E76-8B5F-B5445813E143}"/>
               </a:ext>
             </a:extLst>
           </p:cNvPr>
@@ -1237,7 +1237,7 @@
           <p:cNvPr id="2" name="Title 1">
             <a:extLst>
               <a:ext uri="{FF2B5EF4-FFF2-40B4-BE49-F238E27FC236}">
-                <a16:creationId xmlns:a16="http://schemas.microsoft.com/office/drawing/2014/main" id="{491BC8D4-1AA0-4160-8701-47B5F47193D3}"/>
+                <a16:creationId xmlns:a16="http://schemas.microsoft.com/office/drawing/2014/main" xmlns="" id="{491BC8D4-1AA0-4160-8701-47B5F47193D3}"/>
               </a:ext>
             </a:extLst>
           </p:cNvPr>
@@ -1265,7 +1265,7 @@
           <p:cNvPr id="3" name="Content Placeholder 2">
             <a:extLst>
               <a:ext uri="{FF2B5EF4-FFF2-40B4-BE49-F238E27FC236}">
-                <a16:creationId xmlns:a16="http://schemas.microsoft.com/office/drawing/2014/main" id="{7F154873-2121-431D-B9CF-83C3E9E36E57}"/>
+                <a16:creationId xmlns:a16="http://schemas.microsoft.com/office/drawing/2014/main" xmlns="" id="{7F154873-2121-431D-B9CF-83C3E9E36E57}"/>
               </a:ext>
             </a:extLst>
           </p:cNvPr>
@@ -1327,7 +1327,7 @@
           <p:cNvPr id="4" name="Content Placeholder 3">
             <a:extLst>
               <a:ext uri="{FF2B5EF4-FFF2-40B4-BE49-F238E27FC236}">
-                <a16:creationId xmlns:a16="http://schemas.microsoft.com/office/drawing/2014/main" id="{A6C38A70-7FDC-40F3-B60F-4CB582D0756F}"/>
+                <a16:creationId xmlns:a16="http://schemas.microsoft.com/office/drawing/2014/main" xmlns="" id="{A6C38A70-7FDC-40F3-B60F-4CB582D0756F}"/>
               </a:ext>
             </a:extLst>
           </p:cNvPr>
@@ -1389,7 +1389,7 @@
           <p:cNvPr id="5" name="Date Placeholder 4">
             <a:extLst>
               <a:ext uri="{FF2B5EF4-FFF2-40B4-BE49-F238E27FC236}">
-                <a16:creationId xmlns:a16="http://schemas.microsoft.com/office/drawing/2014/main" id="{A8C3B2E6-3EED-491C-BB77-95D974CF96DC}"/>
+                <a16:creationId xmlns:a16="http://schemas.microsoft.com/office/drawing/2014/main" xmlns="" id="{A8C3B2E6-3EED-491C-BB77-95D974CF96DC}"/>
               </a:ext>
             </a:extLst>
           </p:cNvPr>
@@ -1407,7 +1407,7 @@
           <a:p>
             <a:fld id="{38711518-FC91-48DB-9CD3-4268B4CCA569}" type="datetimeFigureOut">
               <a:rPr lang="en-US" smtClean="0"/>
-              <a:t>9/21/2017</a:t>
+              <a:t>10/1/17</a:t>
             </a:fld>
             <a:endParaRPr lang="en-US"/>
           </a:p>
@@ -1418,7 +1418,7 @@
           <p:cNvPr id="6" name="Footer Placeholder 5">
             <a:extLst>
               <a:ext uri="{FF2B5EF4-FFF2-40B4-BE49-F238E27FC236}">
-                <a16:creationId xmlns:a16="http://schemas.microsoft.com/office/drawing/2014/main" id="{E014009F-298C-41B6-AFEE-A5907DF07775}"/>
+                <a16:creationId xmlns:a16="http://schemas.microsoft.com/office/drawing/2014/main" xmlns="" id="{E014009F-298C-41B6-AFEE-A5907DF07775}"/>
               </a:ext>
             </a:extLst>
           </p:cNvPr>
@@ -1443,7 +1443,7 @@
           <p:cNvPr id="7" name="Slide Number Placeholder 6">
             <a:extLst>
               <a:ext uri="{FF2B5EF4-FFF2-40B4-BE49-F238E27FC236}">
-                <a16:creationId xmlns:a16="http://schemas.microsoft.com/office/drawing/2014/main" id="{00C55D93-2B29-45A3-8B65-9B15B468BACB}"/>
+                <a16:creationId xmlns:a16="http://schemas.microsoft.com/office/drawing/2014/main" xmlns="" id="{00C55D93-2B29-45A3-8B65-9B15B468BACB}"/>
               </a:ext>
             </a:extLst>
           </p:cNvPr>
@@ -1502,7 +1502,7 @@
           <p:cNvPr id="2" name="Title 1">
             <a:extLst>
               <a:ext uri="{FF2B5EF4-FFF2-40B4-BE49-F238E27FC236}">
-                <a16:creationId xmlns:a16="http://schemas.microsoft.com/office/drawing/2014/main" id="{BC5826A4-EC27-47BA-99BC-6989FAD1C4B2}"/>
+                <a16:creationId xmlns:a16="http://schemas.microsoft.com/office/drawing/2014/main" xmlns="" id="{BC5826A4-EC27-47BA-99BC-6989FAD1C4B2}"/>
               </a:ext>
             </a:extLst>
           </p:cNvPr>
@@ -1535,7 +1535,7 @@
           <p:cNvPr id="3" name="Text Placeholder 2">
             <a:extLst>
               <a:ext uri="{FF2B5EF4-FFF2-40B4-BE49-F238E27FC236}">
-                <a16:creationId xmlns:a16="http://schemas.microsoft.com/office/drawing/2014/main" id="{939B4586-B36C-4C2E-9C94-3F8E33E97623}"/>
+                <a16:creationId xmlns:a16="http://schemas.microsoft.com/office/drawing/2014/main" xmlns="" id="{939B4586-B36C-4C2E-9C94-3F8E33E97623}"/>
               </a:ext>
             </a:extLst>
           </p:cNvPr>
@@ -1606,7 +1606,7 @@
           <p:cNvPr id="4" name="Content Placeholder 3">
             <a:extLst>
               <a:ext uri="{FF2B5EF4-FFF2-40B4-BE49-F238E27FC236}">
-                <a16:creationId xmlns:a16="http://schemas.microsoft.com/office/drawing/2014/main" id="{7CAE6056-1F1E-412D-9E78-4D9A3FFC993C}"/>
+                <a16:creationId xmlns:a16="http://schemas.microsoft.com/office/drawing/2014/main" xmlns="" id="{7CAE6056-1F1E-412D-9E78-4D9A3FFC993C}"/>
               </a:ext>
             </a:extLst>
           </p:cNvPr>
@@ -1668,7 +1668,7 @@
           <p:cNvPr id="5" name="Text Placeholder 4">
             <a:extLst>
               <a:ext uri="{FF2B5EF4-FFF2-40B4-BE49-F238E27FC236}">
-                <a16:creationId xmlns:a16="http://schemas.microsoft.com/office/drawing/2014/main" id="{5865028B-8EBE-41A1-8F5A-D43670CA12F4}"/>
+                <a16:creationId xmlns:a16="http://schemas.microsoft.com/office/drawing/2014/main" xmlns="" id="{5865028B-8EBE-41A1-8F5A-D43670CA12F4}"/>
               </a:ext>
             </a:extLst>
           </p:cNvPr>
@@ -1739,7 +1739,7 @@
           <p:cNvPr id="6" name="Content Placeholder 5">
             <a:extLst>
               <a:ext uri="{FF2B5EF4-FFF2-40B4-BE49-F238E27FC236}">
-                <a16:creationId xmlns:a16="http://schemas.microsoft.com/office/drawing/2014/main" id="{40E8F8E7-7D91-4BF1-A6C4-C32EA0E68B5F}"/>
+                <a16:creationId xmlns:a16="http://schemas.microsoft.com/office/drawing/2014/main" xmlns="" id="{40E8F8E7-7D91-4BF1-A6C4-C32EA0E68B5F}"/>
               </a:ext>
             </a:extLst>
           </p:cNvPr>
@@ -1801,7 +1801,7 @@
           <p:cNvPr id="7" name="Date Placeholder 6">
             <a:extLst>
               <a:ext uri="{FF2B5EF4-FFF2-40B4-BE49-F238E27FC236}">
-                <a16:creationId xmlns:a16="http://schemas.microsoft.com/office/drawing/2014/main" id="{BD03A3D7-F029-41F9-8616-A56D9FE54376}"/>
+                <a16:creationId xmlns:a16="http://schemas.microsoft.com/office/drawing/2014/main" xmlns="" id="{BD03A3D7-F029-41F9-8616-A56D9FE54376}"/>
               </a:ext>
             </a:extLst>
           </p:cNvPr>
@@ -1819,7 +1819,7 @@
           <a:p>
             <a:fld id="{38711518-FC91-48DB-9CD3-4268B4CCA569}" type="datetimeFigureOut">
               <a:rPr lang="en-US" smtClean="0"/>
-              <a:t>9/21/2017</a:t>
+              <a:t>10/1/17</a:t>
             </a:fld>
             <a:endParaRPr lang="en-US"/>
           </a:p>
@@ -1830,7 +1830,7 @@
           <p:cNvPr id="8" name="Footer Placeholder 7">
             <a:extLst>
               <a:ext uri="{FF2B5EF4-FFF2-40B4-BE49-F238E27FC236}">
-                <a16:creationId xmlns:a16="http://schemas.microsoft.com/office/drawing/2014/main" id="{91EAAF15-00A4-4A8E-BD37-64D567E3D80C}"/>
+                <a16:creationId xmlns:a16="http://schemas.microsoft.com/office/drawing/2014/main" xmlns="" id="{91EAAF15-00A4-4A8E-BD37-64D567E3D80C}"/>
               </a:ext>
             </a:extLst>
           </p:cNvPr>
@@ -1855,7 +1855,7 @@
           <p:cNvPr id="9" name="Slide Number Placeholder 8">
             <a:extLst>
               <a:ext uri="{FF2B5EF4-FFF2-40B4-BE49-F238E27FC236}">
-                <a16:creationId xmlns:a16="http://schemas.microsoft.com/office/drawing/2014/main" id="{6DE368EE-A40F-457A-8E3F-C951BE499917}"/>
+                <a16:creationId xmlns:a16="http://schemas.microsoft.com/office/drawing/2014/main" xmlns="" id="{6DE368EE-A40F-457A-8E3F-C951BE499917}"/>
               </a:ext>
             </a:extLst>
           </p:cNvPr>
@@ -1914,7 +1914,7 @@
           <p:cNvPr id="2" name="Title 1">
             <a:extLst>
               <a:ext uri="{FF2B5EF4-FFF2-40B4-BE49-F238E27FC236}">
-                <a16:creationId xmlns:a16="http://schemas.microsoft.com/office/drawing/2014/main" id="{DDF87046-FA71-4F91-BC34-6C857FACC043}"/>
+                <a16:creationId xmlns:a16="http://schemas.microsoft.com/office/drawing/2014/main" xmlns="" id="{DDF87046-FA71-4F91-BC34-6C857FACC043}"/>
               </a:ext>
             </a:extLst>
           </p:cNvPr>
@@ -1942,7 +1942,7 @@
           <p:cNvPr id="3" name="Date Placeholder 2">
             <a:extLst>
               <a:ext uri="{FF2B5EF4-FFF2-40B4-BE49-F238E27FC236}">
-                <a16:creationId xmlns:a16="http://schemas.microsoft.com/office/drawing/2014/main" id="{8B61D844-ED85-4303-B85B-085C9654BDBA}"/>
+                <a16:creationId xmlns:a16="http://schemas.microsoft.com/office/drawing/2014/main" xmlns="" id="{8B61D844-ED85-4303-B85B-085C9654BDBA}"/>
               </a:ext>
             </a:extLst>
           </p:cNvPr>
@@ -1960,7 +1960,7 @@
           <a:p>
             <a:fld id="{38711518-FC91-48DB-9CD3-4268B4CCA569}" type="datetimeFigureOut">
               <a:rPr lang="en-US" smtClean="0"/>
-              <a:t>9/21/2017</a:t>
+              <a:t>10/1/17</a:t>
             </a:fld>
             <a:endParaRPr lang="en-US"/>
           </a:p>
@@ -1971,7 +1971,7 @@
           <p:cNvPr id="4" name="Footer Placeholder 3">
             <a:extLst>
               <a:ext uri="{FF2B5EF4-FFF2-40B4-BE49-F238E27FC236}">
-                <a16:creationId xmlns:a16="http://schemas.microsoft.com/office/drawing/2014/main" id="{2265C7BF-04EA-43BE-8D0E-01DDEE5A2DCF}"/>
+                <a16:creationId xmlns:a16="http://schemas.microsoft.com/office/drawing/2014/main" xmlns="" id="{2265C7BF-04EA-43BE-8D0E-01DDEE5A2DCF}"/>
               </a:ext>
             </a:extLst>
           </p:cNvPr>
@@ -1996,7 +1996,7 @@
           <p:cNvPr id="5" name="Slide Number Placeholder 4">
             <a:extLst>
               <a:ext uri="{FF2B5EF4-FFF2-40B4-BE49-F238E27FC236}">
-                <a16:creationId xmlns:a16="http://schemas.microsoft.com/office/drawing/2014/main" id="{3888A879-1F39-46E2-9884-2A0CF3A63973}"/>
+                <a16:creationId xmlns:a16="http://schemas.microsoft.com/office/drawing/2014/main" xmlns="" id="{3888A879-1F39-46E2-9884-2A0CF3A63973}"/>
               </a:ext>
             </a:extLst>
           </p:cNvPr>
@@ -2055,7 +2055,7 @@
           <p:cNvPr id="2" name="Date Placeholder 1">
             <a:extLst>
               <a:ext uri="{FF2B5EF4-FFF2-40B4-BE49-F238E27FC236}">
-                <a16:creationId xmlns:a16="http://schemas.microsoft.com/office/drawing/2014/main" id="{D626C6C2-D40F-4E2E-84A4-5F906156BE81}"/>
+                <a16:creationId xmlns:a16="http://schemas.microsoft.com/office/drawing/2014/main" xmlns="" id="{D626C6C2-D40F-4E2E-84A4-5F906156BE81}"/>
               </a:ext>
             </a:extLst>
           </p:cNvPr>
@@ -2073,7 +2073,7 @@
           <a:p>
             <a:fld id="{38711518-FC91-48DB-9CD3-4268B4CCA569}" type="datetimeFigureOut">
               <a:rPr lang="en-US" smtClean="0"/>
-              <a:t>9/21/2017</a:t>
+              <a:t>10/1/17</a:t>
             </a:fld>
             <a:endParaRPr lang="en-US"/>
           </a:p>
@@ -2084,7 +2084,7 @@
           <p:cNvPr id="3" name="Footer Placeholder 2">
             <a:extLst>
               <a:ext uri="{FF2B5EF4-FFF2-40B4-BE49-F238E27FC236}">
-                <a16:creationId xmlns:a16="http://schemas.microsoft.com/office/drawing/2014/main" id="{6A7DB291-B8E9-4914-90F5-70D2F494780C}"/>
+                <a16:creationId xmlns:a16="http://schemas.microsoft.com/office/drawing/2014/main" xmlns="" id="{6A7DB291-B8E9-4914-90F5-70D2F494780C}"/>
               </a:ext>
             </a:extLst>
           </p:cNvPr>
@@ -2109,7 +2109,7 @@
           <p:cNvPr id="4" name="Slide Number Placeholder 3">
             <a:extLst>
               <a:ext uri="{FF2B5EF4-FFF2-40B4-BE49-F238E27FC236}">
-                <a16:creationId xmlns:a16="http://schemas.microsoft.com/office/drawing/2014/main" id="{B9516A96-7975-40D3-9681-B45FA1B1B4C7}"/>
+                <a16:creationId xmlns:a16="http://schemas.microsoft.com/office/drawing/2014/main" xmlns="" id="{B9516A96-7975-40D3-9681-B45FA1B1B4C7}"/>
               </a:ext>
             </a:extLst>
           </p:cNvPr>
@@ -2168,7 +2168,7 @@
           <p:cNvPr id="2" name="Title 1">
             <a:extLst>
               <a:ext uri="{FF2B5EF4-FFF2-40B4-BE49-F238E27FC236}">
-                <a16:creationId xmlns:a16="http://schemas.microsoft.com/office/drawing/2014/main" id="{4B62B1B7-6341-4EED-AC63-11A002EF8DA3}"/>
+                <a16:creationId xmlns:a16="http://schemas.microsoft.com/office/drawing/2014/main" xmlns="" id="{4B62B1B7-6341-4EED-AC63-11A002EF8DA3}"/>
               </a:ext>
             </a:extLst>
           </p:cNvPr>
@@ -2205,7 +2205,7 @@
           <p:cNvPr id="3" name="Content Placeholder 2">
             <a:extLst>
               <a:ext uri="{FF2B5EF4-FFF2-40B4-BE49-F238E27FC236}">
-                <a16:creationId xmlns:a16="http://schemas.microsoft.com/office/drawing/2014/main" id="{26B162BD-CCDF-441F-AC33-7100D3890DB8}"/>
+                <a16:creationId xmlns:a16="http://schemas.microsoft.com/office/drawing/2014/main" xmlns="" id="{26B162BD-CCDF-441F-AC33-7100D3890DB8}"/>
               </a:ext>
             </a:extLst>
           </p:cNvPr>
@@ -2295,7 +2295,7 @@
           <p:cNvPr id="4" name="Text Placeholder 3">
             <a:extLst>
               <a:ext uri="{FF2B5EF4-FFF2-40B4-BE49-F238E27FC236}">
-                <a16:creationId xmlns:a16="http://schemas.microsoft.com/office/drawing/2014/main" id="{91106014-A17C-4157-9508-ED8D76FA4A87}"/>
+                <a16:creationId xmlns:a16="http://schemas.microsoft.com/office/drawing/2014/main" xmlns="" id="{91106014-A17C-4157-9508-ED8D76FA4A87}"/>
               </a:ext>
             </a:extLst>
           </p:cNvPr>
@@ -2366,7 +2366,7 @@
           <p:cNvPr id="5" name="Date Placeholder 4">
             <a:extLst>
               <a:ext uri="{FF2B5EF4-FFF2-40B4-BE49-F238E27FC236}">
-                <a16:creationId xmlns:a16="http://schemas.microsoft.com/office/drawing/2014/main" id="{1DD13752-2311-4C14-8458-6BEB8503C597}"/>
+                <a16:creationId xmlns:a16="http://schemas.microsoft.com/office/drawing/2014/main" xmlns="" id="{1DD13752-2311-4C14-8458-6BEB8503C597}"/>
               </a:ext>
             </a:extLst>
           </p:cNvPr>
@@ -2384,7 +2384,7 @@
           <a:p>
             <a:fld id="{38711518-FC91-48DB-9CD3-4268B4CCA569}" type="datetimeFigureOut">
               <a:rPr lang="en-US" smtClean="0"/>
-              <a:t>9/21/2017</a:t>
+              <a:t>10/1/17</a:t>
             </a:fld>
             <a:endParaRPr lang="en-US"/>
           </a:p>
@@ -2395,7 +2395,7 @@
           <p:cNvPr id="6" name="Footer Placeholder 5">
             <a:extLst>
               <a:ext uri="{FF2B5EF4-FFF2-40B4-BE49-F238E27FC236}">
-                <a16:creationId xmlns:a16="http://schemas.microsoft.com/office/drawing/2014/main" id="{7AE8B207-205C-4A0E-A7E9-4027DB40A76F}"/>
+                <a16:creationId xmlns:a16="http://schemas.microsoft.com/office/drawing/2014/main" xmlns="" id="{7AE8B207-205C-4A0E-A7E9-4027DB40A76F}"/>
               </a:ext>
             </a:extLst>
           </p:cNvPr>
@@ -2420,7 +2420,7 @@
           <p:cNvPr id="7" name="Slide Number Placeholder 6">
             <a:extLst>
               <a:ext uri="{FF2B5EF4-FFF2-40B4-BE49-F238E27FC236}">
-                <a16:creationId xmlns:a16="http://schemas.microsoft.com/office/drawing/2014/main" id="{4A861886-9D7D-442A-A2F9-CC470D2B986E}"/>
+                <a16:creationId xmlns:a16="http://schemas.microsoft.com/office/drawing/2014/main" xmlns="" id="{4A861886-9D7D-442A-A2F9-CC470D2B986E}"/>
               </a:ext>
             </a:extLst>
           </p:cNvPr>
@@ -2479,7 +2479,7 @@
           <p:cNvPr id="2" name="Title 1">
             <a:extLst>
               <a:ext uri="{FF2B5EF4-FFF2-40B4-BE49-F238E27FC236}">
-                <a16:creationId xmlns:a16="http://schemas.microsoft.com/office/drawing/2014/main" id="{DAA9E558-3196-4C11-AB29-99F22920BD5A}"/>
+                <a16:creationId xmlns:a16="http://schemas.microsoft.com/office/drawing/2014/main" xmlns="" id="{DAA9E558-3196-4C11-AB29-99F22920BD5A}"/>
               </a:ext>
             </a:extLst>
           </p:cNvPr>
@@ -2516,7 +2516,7 @@
           <p:cNvPr id="3" name="Picture Placeholder 2">
             <a:extLst>
               <a:ext uri="{FF2B5EF4-FFF2-40B4-BE49-F238E27FC236}">
-                <a16:creationId xmlns:a16="http://schemas.microsoft.com/office/drawing/2014/main" id="{EC45BB1B-2BCD-4112-9C07-27F7E6DC60BB}"/>
+                <a16:creationId xmlns:a16="http://schemas.microsoft.com/office/drawing/2014/main" xmlns="" id="{EC45BB1B-2BCD-4112-9C07-27F7E6DC60BB}"/>
               </a:ext>
             </a:extLst>
           </p:cNvPr>
@@ -2583,7 +2583,7 @@
           <p:cNvPr id="4" name="Text Placeholder 3">
             <a:extLst>
               <a:ext uri="{FF2B5EF4-FFF2-40B4-BE49-F238E27FC236}">
-                <a16:creationId xmlns:a16="http://schemas.microsoft.com/office/drawing/2014/main" id="{51D59678-41E1-4D5F-8725-0FDF27404B9C}"/>
+                <a16:creationId xmlns:a16="http://schemas.microsoft.com/office/drawing/2014/main" xmlns="" id="{51D59678-41E1-4D5F-8725-0FDF27404B9C}"/>
               </a:ext>
             </a:extLst>
           </p:cNvPr>
@@ -2654,7 +2654,7 @@
           <p:cNvPr id="5" name="Date Placeholder 4">
             <a:extLst>
               <a:ext uri="{FF2B5EF4-FFF2-40B4-BE49-F238E27FC236}">
-                <a16:creationId xmlns:a16="http://schemas.microsoft.com/office/drawing/2014/main" id="{E4B73213-3080-4793-926E-58BC73F20B76}"/>
+                <a16:creationId xmlns:a16="http://schemas.microsoft.com/office/drawing/2014/main" xmlns="" id="{E4B73213-3080-4793-926E-58BC73F20B76}"/>
               </a:ext>
             </a:extLst>
           </p:cNvPr>
@@ -2672,7 +2672,7 @@
           <a:p>
             <a:fld id="{38711518-FC91-48DB-9CD3-4268B4CCA569}" type="datetimeFigureOut">
               <a:rPr lang="en-US" smtClean="0"/>
-              <a:t>9/21/2017</a:t>
+              <a:t>10/1/17</a:t>
             </a:fld>
             <a:endParaRPr lang="en-US"/>
           </a:p>
@@ -2683,7 +2683,7 @@
           <p:cNvPr id="6" name="Footer Placeholder 5">
             <a:extLst>
               <a:ext uri="{FF2B5EF4-FFF2-40B4-BE49-F238E27FC236}">
-                <a16:creationId xmlns:a16="http://schemas.microsoft.com/office/drawing/2014/main" id="{908F6781-671D-440A-9CF9-E37DB12A0034}"/>
+                <a16:creationId xmlns:a16="http://schemas.microsoft.com/office/drawing/2014/main" xmlns="" id="{908F6781-671D-440A-9CF9-E37DB12A0034}"/>
               </a:ext>
             </a:extLst>
           </p:cNvPr>
@@ -2708,7 +2708,7 @@
           <p:cNvPr id="7" name="Slide Number Placeholder 6">
             <a:extLst>
               <a:ext uri="{FF2B5EF4-FFF2-40B4-BE49-F238E27FC236}">
-                <a16:creationId xmlns:a16="http://schemas.microsoft.com/office/drawing/2014/main" id="{E7594C0F-6B0D-4CB9-966B-56B2C506ECE5}"/>
+                <a16:creationId xmlns:a16="http://schemas.microsoft.com/office/drawing/2014/main" xmlns="" id="{E7594C0F-6B0D-4CB9-966B-56B2C506ECE5}"/>
               </a:ext>
             </a:extLst>
           </p:cNvPr>
@@ -2772,7 +2772,7 @@
           <p:cNvPr id="2" name="Title Placeholder 1">
             <a:extLst>
               <a:ext uri="{FF2B5EF4-FFF2-40B4-BE49-F238E27FC236}">
-                <a16:creationId xmlns:a16="http://schemas.microsoft.com/office/drawing/2014/main" id="{1D8C8092-84F0-442F-BAFA-04B2D4A4D42E}"/>
+                <a16:creationId xmlns:a16="http://schemas.microsoft.com/office/drawing/2014/main" xmlns="" id="{1D8C8092-84F0-442F-BAFA-04B2D4A4D42E}"/>
               </a:ext>
             </a:extLst>
           </p:cNvPr>
@@ -2810,7 +2810,7 @@
           <p:cNvPr id="3" name="Text Placeholder 2">
             <a:extLst>
               <a:ext uri="{FF2B5EF4-FFF2-40B4-BE49-F238E27FC236}">
-                <a16:creationId xmlns:a16="http://schemas.microsoft.com/office/drawing/2014/main" id="{61C63B20-3324-40E0-AD32-48C3081F4C64}"/>
+                <a16:creationId xmlns:a16="http://schemas.microsoft.com/office/drawing/2014/main" xmlns="" id="{61C63B20-3324-40E0-AD32-48C3081F4C64}"/>
               </a:ext>
             </a:extLst>
           </p:cNvPr>
@@ -2877,7 +2877,7 @@
           <p:cNvPr id="4" name="Date Placeholder 3">
             <a:extLst>
               <a:ext uri="{FF2B5EF4-FFF2-40B4-BE49-F238E27FC236}">
-                <a16:creationId xmlns:a16="http://schemas.microsoft.com/office/drawing/2014/main" id="{0B164B3F-0033-4430-8CD2-8EB82C9A11DC}"/>
+                <a16:creationId xmlns:a16="http://schemas.microsoft.com/office/drawing/2014/main" xmlns="" id="{0B164B3F-0033-4430-8CD2-8EB82C9A11DC}"/>
               </a:ext>
             </a:extLst>
           </p:cNvPr>
@@ -2913,7 +2913,7 @@
           <a:p>
             <a:fld id="{38711518-FC91-48DB-9CD3-4268B4CCA569}" type="datetimeFigureOut">
               <a:rPr lang="en-US" smtClean="0"/>
-              <a:t>9/21/2017</a:t>
+              <a:t>10/1/17</a:t>
             </a:fld>
             <a:endParaRPr lang="en-US"/>
           </a:p>
@@ -2924,7 +2924,7 @@
           <p:cNvPr id="5" name="Footer Placeholder 4">
             <a:extLst>
               <a:ext uri="{FF2B5EF4-FFF2-40B4-BE49-F238E27FC236}">
-                <a16:creationId xmlns:a16="http://schemas.microsoft.com/office/drawing/2014/main" id="{CD6B1090-140E-47DF-B697-51B15A5C3D07}"/>
+                <a16:creationId xmlns:a16="http://schemas.microsoft.com/office/drawing/2014/main" xmlns="" id="{CD6B1090-140E-47DF-B697-51B15A5C3D07}"/>
               </a:ext>
             </a:extLst>
           </p:cNvPr>
@@ -2967,7 +2967,7 @@
           <p:cNvPr id="6" name="Slide Number Placeholder 5">
             <a:extLst>
               <a:ext uri="{FF2B5EF4-FFF2-40B4-BE49-F238E27FC236}">
-                <a16:creationId xmlns:a16="http://schemas.microsoft.com/office/drawing/2014/main" id="{210DB51C-0C46-436E-837C-6A43D08ACBF9}"/>
+                <a16:creationId xmlns:a16="http://schemas.microsoft.com/office/drawing/2014/main" xmlns="" id="{210DB51C-0C46-436E-837C-6A43D08ACBF9}"/>
               </a:ext>
             </a:extLst>
           </p:cNvPr>
@@ -3335,7 +3335,7 @@
           <p:cNvPr id="4" name="Rectangle: Rounded Corners 3">
             <a:extLst>
               <a:ext uri="{FF2B5EF4-FFF2-40B4-BE49-F238E27FC236}">
-                <a16:creationId xmlns:a16="http://schemas.microsoft.com/office/drawing/2014/main" id="{98EB70E2-93F1-4FFA-A059-71B4BBEE3B6E}"/>
+                <a16:creationId xmlns:a16="http://schemas.microsoft.com/office/drawing/2014/main" xmlns="" id="{98EB70E2-93F1-4FFA-A059-71B4BBEE3B6E}"/>
               </a:ext>
             </a:extLst>
           </p:cNvPr>
@@ -3344,11 +3344,13 @@
         </p:nvSpPr>
         <p:spPr>
           <a:xfrm>
-            <a:off x="2627337" y="2238952"/>
-            <a:ext cx="1920433" cy="2324659"/>
+            <a:off x="2268811" y="2000114"/>
+            <a:ext cx="2278959" cy="2808309"/>
           </a:xfrm>
           <a:prstGeom prst="roundRect">
-            <a:avLst/>
+            <a:avLst>
+              <a:gd name="adj" fmla="val 4102"/>
+            </a:avLst>
           </a:prstGeom>
           <a:noFill/>
           <a:ln>
@@ -3382,48 +3384,12 @@
           </a:p>
         </p:txBody>
       </p:sp>
-      <p:pic>
-        <p:nvPicPr>
-          <p:cNvPr id="12" name="Picture 11" descr="AWS-Cloud.png">
-            <a:extLst>
-              <a:ext uri="{FF2B5EF4-FFF2-40B4-BE49-F238E27FC236}">
-                <a16:creationId xmlns:a16="http://schemas.microsoft.com/office/drawing/2014/main" id="{2AD138EA-266F-47A1-85F6-B8B14967F33F}"/>
-              </a:ext>
-            </a:extLst>
-          </p:cNvPr>
-          <p:cNvPicPr>
-            <a:picLocks noChangeAspect="1"/>
-          </p:cNvPicPr>
-          <p:nvPr/>
-        </p:nvPicPr>
-        <p:blipFill>
-          <a:blip r:embed="rId2">
-            <a:extLst>
-              <a:ext uri="{28A0092B-C50C-407E-A947-70E740481C1C}">
-                <a14:useLocalDpi xmlns:a14="http://schemas.microsoft.com/office/drawing/2010/main" val="0"/>
-              </a:ext>
-            </a:extLst>
-          </a:blip>
-          <a:stretch>
-            <a:fillRect/>
-          </a:stretch>
-        </p:blipFill>
-        <p:spPr>
-          <a:xfrm>
-            <a:off x="2349806" y="1873192"/>
-            <a:ext cx="731520" cy="731520"/>
-          </a:xfrm>
-          <a:prstGeom prst="rect">
-            <a:avLst/>
-          </a:prstGeom>
-        </p:spPr>
-      </p:pic>
       <p:sp>
         <p:nvSpPr>
           <p:cNvPr id="17" name="TextBox 16">
             <a:extLst>
               <a:ext uri="{FF2B5EF4-FFF2-40B4-BE49-F238E27FC236}">
-                <a16:creationId xmlns:a16="http://schemas.microsoft.com/office/drawing/2014/main" id="{AF029AF3-4547-492D-9E11-CC5633A17967}"/>
+                <a16:creationId xmlns:a16="http://schemas.microsoft.com/office/drawing/2014/main" xmlns="" id="{AF029AF3-4547-492D-9E11-CC5633A17967}"/>
               </a:ext>
             </a:extLst>
           </p:cNvPr>
@@ -3432,7 +3398,7 @@
         </p:nvSpPr>
         <p:spPr>
           <a:xfrm>
-            <a:off x="3050997" y="1825156"/>
+            <a:off x="3034153" y="1583673"/>
             <a:ext cx="1525922" cy="461665"/>
           </a:xfrm>
           <a:prstGeom prst="rect">
@@ -3447,13 +3413,13 @@
           <a:lstStyle/>
           <a:p>
             <a:r>
-              <a:rPr lang="en-US" sz="1200" dirty="0"/>
+              <a:rPr lang="en-US" sz="1200" b="1" dirty="0"/>
               <a:t>VPC #1</a:t>
             </a:r>
           </a:p>
           <a:p>
             <a:r>
-              <a:rPr lang="en-US" sz="1200" dirty="0"/>
+              <a:rPr lang="en-US" sz="1200" b="1" dirty="0"/>
               <a:t>CIDR: 10.1.0.0/16</a:t>
             </a:r>
           </a:p>
@@ -3464,7 +3430,7 @@
           <p:cNvPr id="16" name="TextBox 15">
             <a:extLst>
               <a:ext uri="{FF2B5EF4-FFF2-40B4-BE49-F238E27FC236}">
-                <a16:creationId xmlns:a16="http://schemas.microsoft.com/office/drawing/2014/main" id="{2C2ED3CD-1542-4DB7-9D9C-05BE88D7AF77}"/>
+                <a16:creationId xmlns:a16="http://schemas.microsoft.com/office/drawing/2014/main" xmlns="" id="{2C2ED3CD-1542-4DB7-9D9C-05BE88D7AF77}"/>
               </a:ext>
             </a:extLst>
           </p:cNvPr>
@@ -3473,8 +3439,8 @@
         </p:nvSpPr>
         <p:spPr>
           <a:xfrm>
-            <a:off x="3033566" y="2275662"/>
-            <a:ext cx="1285541" cy="461665"/>
+            <a:off x="2371201" y="2212122"/>
+            <a:ext cx="1539012" cy="523220"/>
           </a:xfrm>
           <a:prstGeom prst="rect">
             <a:avLst/>
@@ -3488,13 +3454,13 @@
           <a:lstStyle/>
           <a:p>
             <a:r>
-              <a:rPr lang="en-US" sz="1200" dirty="0"/>
+              <a:rPr lang="en-US" sz="1400" dirty="0"/>
               <a:t>Public Subnet #1</a:t>
             </a:r>
           </a:p>
           <a:p>
             <a:r>
-              <a:rPr lang="en-US" sz="1200" dirty="0"/>
+              <a:rPr lang="en-US" sz="1400" dirty="0"/>
               <a:t>10.1.0.0/24</a:t>
             </a:r>
           </a:p>
@@ -3505,7 +3471,7 @@
           <p:cNvPr id="6" name="Rectangle: Rounded Corners 5">
             <a:extLst>
               <a:ext uri="{FF2B5EF4-FFF2-40B4-BE49-F238E27FC236}">
-                <a16:creationId xmlns:a16="http://schemas.microsoft.com/office/drawing/2014/main" id="{967155B6-352F-4565-ACF1-714318816E14}"/>
+                <a16:creationId xmlns:a16="http://schemas.microsoft.com/office/drawing/2014/main" xmlns="" id="{967155B6-352F-4565-ACF1-714318816E14}"/>
               </a:ext>
             </a:extLst>
           </p:cNvPr>
@@ -3514,8 +3480,8 @@
         </p:nvSpPr>
         <p:spPr>
           <a:xfrm>
-            <a:off x="2832692" y="2686178"/>
-            <a:ext cx="1473321" cy="560040"/>
+            <a:off x="2566710" y="2686178"/>
+            <a:ext cx="1739304" cy="643584"/>
           </a:xfrm>
           <a:prstGeom prst="roundRect">
             <a:avLst/>
@@ -3553,42 +3519,12 @@
           </a:p>
         </p:txBody>
       </p:sp>
-      <p:pic>
-        <p:nvPicPr>
-          <p:cNvPr id="9" name="Picture 8">
-            <a:extLst>
-              <a:ext uri="{FF2B5EF4-FFF2-40B4-BE49-F238E27FC236}">
-                <a16:creationId xmlns:a16="http://schemas.microsoft.com/office/drawing/2014/main" id="{56E5D625-C58B-4334-8758-53A10A3E50D4}"/>
-              </a:ext>
-            </a:extLst>
-          </p:cNvPr>
-          <p:cNvPicPr>
-            <a:picLocks noChangeAspect="1"/>
-          </p:cNvPicPr>
-          <p:nvPr/>
-        </p:nvPicPr>
-        <p:blipFill>
-          <a:blip r:embed="rId3"/>
-          <a:stretch>
-            <a:fillRect/>
-          </a:stretch>
-        </p:blipFill>
-        <p:spPr>
-          <a:xfrm>
-            <a:off x="2928857" y="2759153"/>
-            <a:ext cx="538370" cy="402443"/>
-          </a:xfrm>
-          <a:prstGeom prst="rect">
-            <a:avLst/>
-          </a:prstGeom>
-        </p:spPr>
-      </p:pic>
       <p:sp>
         <p:nvSpPr>
           <p:cNvPr id="27" name="TextBox 26">
             <a:extLst>
               <a:ext uri="{FF2B5EF4-FFF2-40B4-BE49-F238E27FC236}">
-                <a16:creationId xmlns:a16="http://schemas.microsoft.com/office/drawing/2014/main" id="{94510FB9-7C2F-4D4F-9FDE-5C960D7BF4D9}"/>
+                <a16:creationId xmlns:a16="http://schemas.microsoft.com/office/drawing/2014/main" xmlns="" id="{94510FB9-7C2F-4D4F-9FDE-5C960D7BF4D9}"/>
               </a:ext>
             </a:extLst>
           </p:cNvPr>
@@ -3597,8 +3533,8 @@
         </p:nvSpPr>
         <p:spPr>
           <a:xfrm>
-            <a:off x="3452279" y="2645049"/>
-            <a:ext cx="997617" cy="784830"/>
+            <a:off x="2821818" y="2733604"/>
+            <a:ext cx="907247" cy="784830"/>
           </a:xfrm>
           <a:prstGeom prst="rect">
             <a:avLst/>
@@ -3611,24 +3547,28 @@
           </a:bodyPr>
           <a:lstStyle/>
           <a:p>
+            <a:pPr algn="r"/>
             <a:r>
               <a:rPr lang="en-US" sz="1200" dirty="0"/>
               <a:t>Aviatrix</a:t>
             </a:r>
           </a:p>
           <a:p>
+            <a:pPr algn="r"/>
             <a:r>
               <a:rPr lang="en-US" sz="1200" dirty="0"/>
               <a:t>S2C GW #1</a:t>
             </a:r>
           </a:p>
           <a:p>
+            <a:pPr algn="r"/>
             <a:r>
               <a:rPr lang="en-US" sz="800" dirty="0"/>
               <a:t>(vpc-01-avx-gw)</a:t>
             </a:r>
           </a:p>
           <a:p>
+            <a:pPr algn="r"/>
             <a:endParaRPr lang="en-US" sz="1200" dirty="0"/>
           </a:p>
         </p:txBody>
@@ -3638,7 +3578,7 @@
           <p:cNvPr id="59" name="Rectangle: Rounded Corners 58">
             <a:extLst>
               <a:ext uri="{FF2B5EF4-FFF2-40B4-BE49-F238E27FC236}">
-                <a16:creationId xmlns:a16="http://schemas.microsoft.com/office/drawing/2014/main" id="{D05693C1-F91B-4121-BA57-5E941086FBFA}"/>
+                <a16:creationId xmlns:a16="http://schemas.microsoft.com/office/drawing/2014/main" xmlns="" id="{D05693C1-F91B-4121-BA57-5E941086FBFA}"/>
               </a:ext>
             </a:extLst>
           </p:cNvPr>
@@ -3647,11 +3587,13 @@
         </p:nvSpPr>
         <p:spPr>
           <a:xfrm>
-            <a:off x="6309009" y="2238951"/>
-            <a:ext cx="1920433" cy="2249159"/>
+            <a:off x="6203379" y="2061463"/>
+            <a:ext cx="2026063" cy="1392937"/>
           </a:xfrm>
           <a:prstGeom prst="roundRect">
-            <a:avLst/>
+            <a:avLst>
+              <a:gd name="adj" fmla="val 5315"/>
+            </a:avLst>
           </a:prstGeom>
           <a:noFill/>
           <a:ln>
@@ -3685,48 +3627,12 @@
           </a:p>
         </p:txBody>
       </p:sp>
-      <p:pic>
-        <p:nvPicPr>
-          <p:cNvPr id="60" name="Picture 59" descr="AWS-Cloud.png">
-            <a:extLst>
-              <a:ext uri="{FF2B5EF4-FFF2-40B4-BE49-F238E27FC236}">
-                <a16:creationId xmlns:a16="http://schemas.microsoft.com/office/drawing/2014/main" id="{C9322D26-ECB1-468E-9A1D-16C5336058BB}"/>
-              </a:ext>
-            </a:extLst>
-          </p:cNvPr>
-          <p:cNvPicPr>
-            <a:picLocks noChangeAspect="1"/>
-          </p:cNvPicPr>
-          <p:nvPr/>
-        </p:nvPicPr>
-        <p:blipFill>
-          <a:blip r:embed="rId2">
-            <a:extLst>
-              <a:ext uri="{28A0092B-C50C-407E-A947-70E740481C1C}">
-                <a14:useLocalDpi xmlns:a14="http://schemas.microsoft.com/office/drawing/2010/main" val="0"/>
-              </a:ext>
-            </a:extLst>
-          </a:blip>
-          <a:stretch>
-            <a:fillRect/>
-          </a:stretch>
-        </p:blipFill>
-        <p:spPr>
-          <a:xfrm>
-            <a:off x="6031478" y="1873191"/>
-            <a:ext cx="731520" cy="731520"/>
-          </a:xfrm>
-          <a:prstGeom prst="rect">
-            <a:avLst/>
-          </a:prstGeom>
-        </p:spPr>
-      </p:pic>
       <p:sp>
         <p:nvSpPr>
           <p:cNvPr id="61" name="TextBox 60">
             <a:extLst>
               <a:ext uri="{FF2B5EF4-FFF2-40B4-BE49-F238E27FC236}">
-                <a16:creationId xmlns:a16="http://schemas.microsoft.com/office/drawing/2014/main" id="{268BED63-DE7F-4EF8-BD24-91CE185AC1E7}"/>
+                <a16:creationId xmlns:a16="http://schemas.microsoft.com/office/drawing/2014/main" xmlns="" id="{268BED63-DE7F-4EF8-BD24-91CE185AC1E7}"/>
               </a:ext>
             </a:extLst>
           </p:cNvPr>
@@ -3735,7 +3641,7 @@
         </p:nvSpPr>
         <p:spPr>
           <a:xfrm>
-            <a:off x="6770556" y="1813810"/>
+            <a:off x="6739119" y="1599798"/>
             <a:ext cx="1525922" cy="461665"/>
           </a:xfrm>
           <a:prstGeom prst="rect">
@@ -3750,13 +3656,13 @@
           <a:lstStyle/>
           <a:p>
             <a:r>
-              <a:rPr lang="en-US" sz="1200" dirty="0"/>
+              <a:rPr lang="en-US" sz="1200" b="1" dirty="0"/>
               <a:t>VPC #2</a:t>
             </a:r>
           </a:p>
           <a:p>
             <a:r>
-              <a:rPr lang="en-US" sz="1200" dirty="0"/>
+              <a:rPr lang="en-US" sz="1200" b="1" dirty="0"/>
               <a:t>CIDR: 10.2.0.0/16</a:t>
             </a:r>
           </a:p>
@@ -3767,7 +3673,7 @@
           <p:cNvPr id="62" name="TextBox 61">
             <a:extLst>
               <a:ext uri="{FF2B5EF4-FFF2-40B4-BE49-F238E27FC236}">
-                <a16:creationId xmlns:a16="http://schemas.microsoft.com/office/drawing/2014/main" id="{067E1DC1-349A-4EA3-8E41-BACF710E1257}"/>
+                <a16:creationId xmlns:a16="http://schemas.microsoft.com/office/drawing/2014/main" xmlns="" id="{067E1DC1-349A-4EA3-8E41-BACF710E1257}"/>
               </a:ext>
             </a:extLst>
           </p:cNvPr>
@@ -3776,8 +3682,8 @@
         </p:nvSpPr>
         <p:spPr>
           <a:xfrm>
-            <a:off x="6762807" y="2226775"/>
-            <a:ext cx="1218134" cy="461665"/>
+            <a:off x="6318307" y="2087075"/>
+            <a:ext cx="1458314" cy="523220"/>
           </a:xfrm>
           <a:prstGeom prst="rect">
             <a:avLst/>
@@ -3791,67 +3697,15 @@
           <a:lstStyle/>
           <a:p>
             <a:r>
-              <a:rPr lang="en-US" sz="1200" dirty="0"/>
+              <a:rPr lang="en-US" sz="1400" dirty="0"/>
               <a:t>Public Subnet #3</a:t>
             </a:r>
           </a:p>
           <a:p>
             <a:r>
-              <a:rPr lang="en-US" sz="1200" dirty="0"/>
+              <a:rPr lang="en-US" sz="1400" dirty="0"/>
               <a:t>10.2.0.0/24</a:t>
             </a:r>
-          </a:p>
-        </p:txBody>
-      </p:sp>
-      <p:sp>
-        <p:nvSpPr>
-          <p:cNvPr id="84" name="Rectangle: Rounded Corners 83">
-            <a:extLst>
-              <a:ext uri="{FF2B5EF4-FFF2-40B4-BE49-F238E27FC236}">
-                <a16:creationId xmlns:a16="http://schemas.microsoft.com/office/drawing/2014/main" id="{C38F62DD-4BF8-472B-9416-0FBB7344ECD0}"/>
-              </a:ext>
-            </a:extLst>
-          </p:cNvPr>
-          <p:cNvSpPr/>
-          <p:nvPr/>
-        </p:nvSpPr>
-        <p:spPr>
-          <a:xfrm>
-            <a:off x="2792250" y="5192373"/>
-            <a:ext cx="1021708" cy="350280"/>
-          </a:xfrm>
-          <a:prstGeom prst="roundRect">
-            <a:avLst/>
-          </a:prstGeom>
-          <a:noFill/>
-          <a:ln>
-            <a:solidFill>
-              <a:schemeClr val="tx1"/>
-            </a:solidFill>
-          </a:ln>
-        </p:spPr>
-        <p:style>
-          <a:lnRef idx="2">
-            <a:schemeClr val="accent1">
-              <a:shade val="50000"/>
-            </a:schemeClr>
-          </a:lnRef>
-          <a:fillRef idx="1">
-            <a:schemeClr val="accent1"/>
-          </a:fillRef>
-          <a:effectRef idx="0">
-            <a:schemeClr val="accent1"/>
-          </a:effectRef>
-          <a:fontRef idx="minor">
-            <a:schemeClr val="lt1"/>
-          </a:fontRef>
-        </p:style>
-        <p:txBody>
-          <a:bodyPr rtlCol="0" anchor="ctr"/>
-          <a:lstStyle/>
-          <a:p>
-            <a:pPr algn="ctr"/>
-            <a:endParaRPr lang="en-US"/>
           </a:p>
         </p:txBody>
       </p:sp>
@@ -3860,19 +3714,20 @@
           <p:cNvPr id="104" name="Straight Connector 103">
             <a:extLst>
               <a:ext uri="{FF2B5EF4-FFF2-40B4-BE49-F238E27FC236}">
-                <a16:creationId xmlns:a16="http://schemas.microsoft.com/office/drawing/2014/main" id="{8501FB33-5A1B-42F2-8205-777E79D51E7E}"/>
+                <a16:creationId xmlns:a16="http://schemas.microsoft.com/office/drawing/2014/main" xmlns="" id="{8501FB33-5A1B-42F2-8205-777E79D51E7E}"/>
               </a:ext>
             </a:extLst>
           </p:cNvPr>
           <p:cNvCxnSpPr>
             <a:cxnSpLocks/>
+            <a:endCxn id="69" idx="0"/>
           </p:cNvCxnSpPr>
           <p:nvPr/>
         </p:nvCxnSpPr>
         <p:spPr>
           <a:xfrm>
-            <a:off x="3247108" y="4315283"/>
-            <a:ext cx="0" cy="875495"/>
+            <a:off x="3953192" y="4523971"/>
+            <a:ext cx="18633" cy="857340"/>
           </a:xfrm>
           <a:prstGeom prst="line">
             <a:avLst/>
@@ -3901,7 +3756,7 @@
           <p:cNvPr id="107" name="Straight Connector 106">
             <a:extLst>
               <a:ext uri="{FF2B5EF4-FFF2-40B4-BE49-F238E27FC236}">
-                <a16:creationId xmlns:a16="http://schemas.microsoft.com/office/drawing/2014/main" id="{EA4162C8-3CD1-45B6-9F3C-2D57ADAD63C8}"/>
+                <a16:creationId xmlns:a16="http://schemas.microsoft.com/office/drawing/2014/main" xmlns="" id="{EA4162C8-3CD1-45B6-9F3C-2D57ADAD63C8}"/>
               </a:ext>
             </a:extLst>
           </p:cNvPr>
@@ -3911,9 +3766,9 @@
           <p:nvPr/>
         </p:nvCxnSpPr>
         <p:spPr>
-          <a:xfrm flipH="1">
-            <a:off x="4306014" y="3029194"/>
-            <a:ext cx="2327311" cy="0"/>
+          <a:xfrm flipH="1" flipV="1">
+            <a:off x="4185075" y="3014208"/>
+            <a:ext cx="2517362" cy="9119"/>
           </a:xfrm>
           <a:prstGeom prst="line">
             <a:avLst/>
@@ -3950,7 +3805,7 @@
           <p:cNvPr id="116" name="Rectangle: Rounded Corners 115">
             <a:extLst>
               <a:ext uri="{FF2B5EF4-FFF2-40B4-BE49-F238E27FC236}">
-                <a16:creationId xmlns:a16="http://schemas.microsoft.com/office/drawing/2014/main" id="{702A0F6E-3BE2-4B9E-9A77-4D7ADB32DA10}"/>
+                <a16:creationId xmlns:a16="http://schemas.microsoft.com/office/drawing/2014/main" xmlns="" id="{702A0F6E-3BE2-4B9E-9A77-4D7ADB32DA10}"/>
               </a:ext>
             </a:extLst>
           </p:cNvPr>
@@ -3959,11 +3814,13 @@
         </p:nvSpPr>
         <p:spPr>
           <a:xfrm>
-            <a:off x="654508" y="486004"/>
-            <a:ext cx="1564138" cy="1041962"/>
+            <a:off x="6181035" y="3774112"/>
+            <a:ext cx="2017594" cy="1041962"/>
           </a:xfrm>
           <a:prstGeom prst="roundRect">
-            <a:avLst/>
+            <a:avLst>
+              <a:gd name="adj" fmla="val 10573"/>
+            </a:avLst>
           </a:prstGeom>
           <a:noFill/>
           <a:ln>
@@ -3997,77 +3854,12 @@
           </a:p>
         </p:txBody>
       </p:sp>
-      <p:pic>
-        <p:nvPicPr>
-          <p:cNvPr id="117" name="Picture 116" descr="AWS-Cloud.png">
-            <a:extLst>
-              <a:ext uri="{FF2B5EF4-FFF2-40B4-BE49-F238E27FC236}">
-                <a16:creationId xmlns:a16="http://schemas.microsoft.com/office/drawing/2014/main" id="{2185EE60-4462-4660-B242-3A85CF7CFE4E}"/>
-              </a:ext>
-            </a:extLst>
-          </p:cNvPr>
-          <p:cNvPicPr>
-            <a:picLocks noChangeAspect="1"/>
-          </p:cNvPicPr>
-          <p:nvPr/>
-        </p:nvPicPr>
-        <p:blipFill>
-          <a:blip r:embed="rId2">
-            <a:extLst>
-              <a:ext uri="{28A0092B-C50C-407E-A947-70E740481C1C}">
-                <a14:useLocalDpi xmlns:a14="http://schemas.microsoft.com/office/drawing/2010/main" val="0"/>
-              </a:ext>
-            </a:extLst>
-          </a:blip>
-          <a:stretch>
-            <a:fillRect/>
-          </a:stretch>
-        </p:blipFill>
-        <p:spPr>
-          <a:xfrm>
-            <a:off x="288747" y="110186"/>
-            <a:ext cx="731520" cy="731520"/>
-          </a:xfrm>
-          <a:prstGeom prst="rect">
-            <a:avLst/>
-          </a:prstGeom>
-        </p:spPr>
-      </p:pic>
-      <p:pic>
-        <p:nvPicPr>
-          <p:cNvPr id="119" name="Picture 118">
-            <a:extLst>
-              <a:ext uri="{FF2B5EF4-FFF2-40B4-BE49-F238E27FC236}">
-                <a16:creationId xmlns:a16="http://schemas.microsoft.com/office/drawing/2014/main" id="{A8187AF1-9E08-4559-BE0D-F6F19AD55D75}"/>
-              </a:ext>
-            </a:extLst>
-          </p:cNvPr>
-          <p:cNvPicPr>
-            <a:picLocks noChangeAspect="1"/>
-          </p:cNvPicPr>
-          <p:nvPr/>
-        </p:nvPicPr>
-        <p:blipFill rotWithShape="1">
-          <a:blip r:embed="rId3"/>
-          <a:srcRect r="2437" b="23826"/>
-          <a:stretch/>
-        </p:blipFill>
-        <p:spPr>
-          <a:xfrm>
-            <a:off x="1173864" y="956651"/>
-            <a:ext cx="525252" cy="404407"/>
-          </a:xfrm>
-          <a:prstGeom prst="rect">
-            <a:avLst/>
-          </a:prstGeom>
-        </p:spPr>
-      </p:pic>
       <p:sp>
         <p:nvSpPr>
           <p:cNvPr id="120" name="TextBox 119">
             <a:extLst>
               <a:ext uri="{FF2B5EF4-FFF2-40B4-BE49-F238E27FC236}">
-                <a16:creationId xmlns:a16="http://schemas.microsoft.com/office/drawing/2014/main" id="{3277EACA-919C-4B21-8753-CD26CFD9EDA3}"/>
+                <a16:creationId xmlns:a16="http://schemas.microsoft.com/office/drawing/2014/main" xmlns="" id="{3277EACA-919C-4B21-8753-CD26CFD9EDA3}"/>
               </a:ext>
             </a:extLst>
           </p:cNvPr>
@@ -4076,7 +3868,7 @@
         </p:nvSpPr>
         <p:spPr>
           <a:xfrm>
-            <a:off x="756982" y="679652"/>
+            <a:off x="6283509" y="4499180"/>
             <a:ext cx="1359016" cy="276999"/>
           </a:xfrm>
           <a:prstGeom prst="rect">
@@ -4102,7 +3894,7 @@
           <p:cNvPr id="172" name="Rectangle 171">
             <a:extLst>
               <a:ext uri="{FF2B5EF4-FFF2-40B4-BE49-F238E27FC236}">
-                <a16:creationId xmlns:a16="http://schemas.microsoft.com/office/drawing/2014/main" id="{94B47A5D-D1B9-4963-B677-3EB8285EDF19}"/>
+                <a16:creationId xmlns:a16="http://schemas.microsoft.com/office/drawing/2014/main" xmlns="" id="{94B47A5D-D1B9-4963-B677-3EB8285EDF19}"/>
               </a:ext>
             </a:extLst>
           </p:cNvPr>
@@ -4139,10 +3931,10 @@
       </p:sp>
       <p:cxnSp>
         <p:nvCxnSpPr>
-          <p:cNvPr id="66" name="Straight Connector 65">
-            <a:extLst>
-              <a:ext uri="{FF2B5EF4-FFF2-40B4-BE49-F238E27FC236}">
-                <a16:creationId xmlns:a16="http://schemas.microsoft.com/office/drawing/2014/main" id="{E573F1BA-7EDE-4D7D-B5F3-0DF5132189FE}"/>
+          <p:cNvPr id="85" name="Straight Connector 84">
+            <a:extLst>
+              <a:ext uri="{FF2B5EF4-FFF2-40B4-BE49-F238E27FC236}">
+                <a16:creationId xmlns:a16="http://schemas.microsoft.com/office/drawing/2014/main" xmlns="" id="{0C19283A-E899-4F65-8171-B15E0D02268B}"/>
               </a:ext>
             </a:extLst>
           </p:cNvPr>
@@ -4152,156 +3944,8 @@
           <p:nvPr/>
         </p:nvCxnSpPr>
         <p:spPr>
-          <a:xfrm>
-            <a:off x="1705199" y="1116297"/>
-            <a:ext cx="5409306" cy="1654159"/>
-          </a:xfrm>
-          <a:prstGeom prst="line">
-            <a:avLst/>
-          </a:prstGeom>
-          <a:ln w="28575">
-            <a:solidFill>
-              <a:schemeClr val="accent1">
-                <a:lumMod val="20000"/>
-                <a:lumOff val="80000"/>
-              </a:schemeClr>
-            </a:solidFill>
-            <a:prstDash val="dash"/>
-          </a:ln>
-        </p:spPr>
-        <p:style>
-          <a:lnRef idx="1">
-            <a:schemeClr val="accent1"/>
-          </a:lnRef>
-          <a:fillRef idx="0">
-            <a:schemeClr val="accent1"/>
-          </a:fillRef>
-          <a:effectRef idx="0">
-            <a:schemeClr val="accent1"/>
-          </a:effectRef>
-          <a:fontRef idx="minor">
-            <a:schemeClr val="tx1"/>
-          </a:fontRef>
-        </p:style>
-      </p:cxnSp>
-      <p:cxnSp>
-        <p:nvCxnSpPr>
-          <p:cNvPr id="74" name="Straight Connector 73">
-            <a:extLst>
-              <a:ext uri="{FF2B5EF4-FFF2-40B4-BE49-F238E27FC236}">
-                <a16:creationId xmlns:a16="http://schemas.microsoft.com/office/drawing/2014/main" id="{7D1188B2-3F0A-4ED4-8A27-E25CBBFA867A}"/>
-              </a:ext>
-            </a:extLst>
-          </p:cNvPr>
-          <p:cNvCxnSpPr>
-            <a:cxnSpLocks/>
-            <a:stCxn id="119" idx="2"/>
-            <a:endCxn id="9" idx="1"/>
-          </p:cNvCxnSpPr>
-          <p:nvPr/>
-        </p:nvCxnSpPr>
-        <p:spPr>
-          <a:xfrm>
-            <a:off x="1436490" y="1361058"/>
-            <a:ext cx="1492367" cy="1599317"/>
-          </a:xfrm>
-          <a:prstGeom prst="line">
-            <a:avLst/>
-          </a:prstGeom>
-          <a:ln w="28575">
-            <a:solidFill>
-              <a:schemeClr val="accent1">
-                <a:lumMod val="20000"/>
-                <a:lumOff val="80000"/>
-              </a:schemeClr>
-            </a:solidFill>
-            <a:prstDash val="dash"/>
-          </a:ln>
-        </p:spPr>
-        <p:style>
-          <a:lnRef idx="1">
-            <a:schemeClr val="accent1"/>
-          </a:lnRef>
-          <a:fillRef idx="0">
-            <a:schemeClr val="accent1"/>
-          </a:fillRef>
-          <a:effectRef idx="0">
-            <a:schemeClr val="accent1"/>
-          </a:effectRef>
-          <a:fontRef idx="minor">
-            <a:schemeClr val="tx1"/>
-          </a:fontRef>
-        </p:style>
-      </p:cxnSp>
-      <p:sp>
-        <p:nvSpPr>
-          <p:cNvPr id="80" name="Rectangle: Rounded Corners 79">
-            <a:extLst>
-              <a:ext uri="{FF2B5EF4-FFF2-40B4-BE49-F238E27FC236}">
-                <a16:creationId xmlns:a16="http://schemas.microsoft.com/office/drawing/2014/main" id="{B20E9259-2ED4-43CD-A692-1EE4A7302294}"/>
-              </a:ext>
-            </a:extLst>
-          </p:cNvPr>
-          <p:cNvSpPr/>
-          <p:nvPr/>
-        </p:nvSpPr>
-        <p:spPr>
-          <a:xfrm>
-            <a:off x="9990681" y="3014946"/>
-            <a:ext cx="1534484" cy="1842280"/>
-          </a:xfrm>
-          <a:prstGeom prst="roundRect">
-            <a:avLst/>
-          </a:prstGeom>
-          <a:noFill/>
-          <a:ln>
-            <a:solidFill>
-              <a:schemeClr val="tx1"/>
-            </a:solidFill>
-          </a:ln>
-        </p:spPr>
-        <p:style>
-          <a:lnRef idx="2">
-            <a:schemeClr val="accent1">
-              <a:shade val="50000"/>
-            </a:schemeClr>
-          </a:lnRef>
-          <a:fillRef idx="1">
-            <a:schemeClr val="accent1"/>
-          </a:fillRef>
-          <a:effectRef idx="0">
-            <a:schemeClr val="accent1"/>
-          </a:effectRef>
-          <a:fontRef idx="minor">
-            <a:schemeClr val="lt1"/>
-          </a:fontRef>
-        </p:style>
-        <p:txBody>
-          <a:bodyPr rtlCol="0" anchor="ctr"/>
-          <a:lstStyle/>
-          <a:p>
-            <a:pPr algn="ctr"/>
-            <a:endParaRPr lang="en-US"/>
-          </a:p>
-        </p:txBody>
-      </p:sp>
-      <p:cxnSp>
-        <p:nvCxnSpPr>
-          <p:cNvPr id="85" name="Straight Connector 84">
-            <a:extLst>
-              <a:ext uri="{FF2B5EF4-FFF2-40B4-BE49-F238E27FC236}">
-                <a16:creationId xmlns:a16="http://schemas.microsoft.com/office/drawing/2014/main" id="{0C19283A-E899-4F65-8171-B15E0D02268B}"/>
-              </a:ext>
-            </a:extLst>
-          </p:cNvPr>
-          <p:cNvCxnSpPr>
-            <a:cxnSpLocks/>
-          </p:cNvCxnSpPr>
-          <p:nvPr/>
-        </p:nvCxnSpPr>
-        <p:spPr>
           <a:xfrm flipH="1">
-            <a:off x="10142048" y="3330241"/>
+            <a:off x="9117371" y="3867326"/>
             <a:ext cx="1207787" cy="0"/>
           </a:xfrm>
           <a:prstGeom prst="line">
@@ -4331,7 +3975,7 @@
           <p:cNvPr id="89" name="Straight Connector 88">
             <a:extLst>
               <a:ext uri="{FF2B5EF4-FFF2-40B4-BE49-F238E27FC236}">
-                <a16:creationId xmlns:a16="http://schemas.microsoft.com/office/drawing/2014/main" id="{9242E16D-0382-4387-8BBD-1A8EE19E569F}"/>
+                <a16:creationId xmlns:a16="http://schemas.microsoft.com/office/drawing/2014/main" xmlns="" id="{9242E16D-0382-4387-8BBD-1A8EE19E569F}"/>
               </a:ext>
             </a:extLst>
           </p:cNvPr>
@@ -4342,17 +3986,16 @@
         </p:nvCxnSpPr>
         <p:spPr>
           <a:xfrm>
-            <a:off x="10146677" y="3750555"/>
+            <a:off x="9122000" y="4338440"/>
             <a:ext cx="1280160" cy="0"/>
           </a:xfrm>
           <a:prstGeom prst="line">
             <a:avLst/>
           </a:prstGeom>
-          <a:ln w="28575">
+          <a:ln w="19050">
             <a:solidFill>
-              <a:schemeClr val="accent1">
-                <a:lumMod val="20000"/>
-                <a:lumOff val="80000"/>
+              <a:schemeClr val="bg1">
+                <a:lumMod val="50000"/>
               </a:schemeClr>
             </a:solidFill>
             <a:prstDash val="dash"/>
@@ -4378,7 +4021,7 @@
           <p:cNvPr id="90" name="Straight Connector 89">
             <a:extLst>
               <a:ext uri="{FF2B5EF4-FFF2-40B4-BE49-F238E27FC236}">
-                <a16:creationId xmlns:a16="http://schemas.microsoft.com/office/drawing/2014/main" id="{740C1259-1C3D-4F33-8452-E778B72A47A5}"/>
+                <a16:creationId xmlns:a16="http://schemas.microsoft.com/office/drawing/2014/main" xmlns="" id="{740C1259-1C3D-4F33-8452-E778B72A47A5}"/>
               </a:ext>
             </a:extLst>
           </p:cNvPr>
@@ -4389,7 +4032,7 @@
         </p:nvCxnSpPr>
         <p:spPr>
           <a:xfrm flipH="1">
-            <a:off x="10145515" y="4106842"/>
+            <a:off x="9120838" y="4770927"/>
             <a:ext cx="1280160" cy="0"/>
           </a:xfrm>
           <a:prstGeom prst="line">
@@ -4427,7 +4070,7 @@
           <p:cNvPr id="41" name="TextBox 40">
             <a:extLst>
               <a:ext uri="{FF2B5EF4-FFF2-40B4-BE49-F238E27FC236}">
-                <a16:creationId xmlns:a16="http://schemas.microsoft.com/office/drawing/2014/main" id="{05778569-C8D8-4CD9-82E9-C870B58BFA2D}"/>
+                <a16:creationId xmlns:a16="http://schemas.microsoft.com/office/drawing/2014/main" xmlns="" id="{05778569-C8D8-4CD9-82E9-C870B58BFA2D}"/>
               </a:ext>
             </a:extLst>
           </p:cNvPr>
@@ -4436,7 +4079,7 @@
         </p:nvSpPr>
         <p:spPr>
           <a:xfrm>
-            <a:off x="10121928" y="3053242"/>
+            <a:off x="9097251" y="3590327"/>
             <a:ext cx="1329655" cy="276999"/>
           </a:xfrm>
           <a:prstGeom prst="rect">
@@ -4462,7 +4105,7 @@
           <p:cNvPr id="95" name="TextBox 94">
             <a:extLst>
               <a:ext uri="{FF2B5EF4-FFF2-40B4-BE49-F238E27FC236}">
-                <a16:creationId xmlns:a16="http://schemas.microsoft.com/office/drawing/2014/main" id="{E37A25A6-7B5B-48A6-9BFE-0A0665C995EE}"/>
+                <a16:creationId xmlns:a16="http://schemas.microsoft.com/office/drawing/2014/main" xmlns="" id="{E37A25A6-7B5B-48A6-9BFE-0A0665C995EE}"/>
               </a:ext>
             </a:extLst>
           </p:cNvPr>
@@ -4471,7 +4114,7 @@
         </p:nvSpPr>
         <p:spPr>
           <a:xfrm>
-            <a:off x="10026995" y="3458860"/>
+            <a:off x="9002318" y="4059445"/>
             <a:ext cx="1506193" cy="276999"/>
           </a:xfrm>
           <a:prstGeom prst="rect">
@@ -4497,7 +4140,7 @@
           <p:cNvPr id="98" name="TextBox 97">
             <a:extLst>
               <a:ext uri="{FF2B5EF4-FFF2-40B4-BE49-F238E27FC236}">
-                <a16:creationId xmlns:a16="http://schemas.microsoft.com/office/drawing/2014/main" id="{BF9F1B56-326A-4DDE-A256-B52C5FAD3A35}"/>
+                <a16:creationId xmlns:a16="http://schemas.microsoft.com/office/drawing/2014/main" xmlns="" id="{BF9F1B56-326A-4DDE-A256-B52C5FAD3A35}"/>
               </a:ext>
             </a:extLst>
           </p:cNvPr>
@@ -4506,7 +4149,7 @@
         </p:nvSpPr>
         <p:spPr>
           <a:xfrm>
-            <a:off x="10026995" y="3822175"/>
+            <a:off x="9002318" y="4486260"/>
             <a:ext cx="1506193" cy="276999"/>
           </a:xfrm>
           <a:prstGeom prst="rect">
@@ -4533,7 +4176,7 @@
           <p:cNvPr id="102" name="Rectangle: Rounded Corners 101">
             <a:extLst>
               <a:ext uri="{FF2B5EF4-FFF2-40B4-BE49-F238E27FC236}">
-                <a16:creationId xmlns:a16="http://schemas.microsoft.com/office/drawing/2014/main" id="{7C7BA9FE-0CB4-43B6-BE66-624F150A15A6}"/>
+                <a16:creationId xmlns:a16="http://schemas.microsoft.com/office/drawing/2014/main" xmlns="" id="{7C7BA9FE-0CB4-43B6-BE66-624F150A15A6}"/>
               </a:ext>
             </a:extLst>
           </p:cNvPr>
@@ -4542,8 +4185,8 @@
         </p:nvSpPr>
         <p:spPr>
           <a:xfrm>
-            <a:off x="6631871" y="2697481"/>
-            <a:ext cx="1473321" cy="560040"/>
+            <a:off x="6484599" y="2570481"/>
+            <a:ext cx="1620593" cy="799718"/>
           </a:xfrm>
           <a:prstGeom prst="roundRect">
             <a:avLst/>
@@ -4581,42 +4224,12 @@
           </a:p>
         </p:txBody>
       </p:sp>
-      <p:pic>
-        <p:nvPicPr>
-          <p:cNvPr id="105" name="Picture 104">
-            <a:extLst>
-              <a:ext uri="{FF2B5EF4-FFF2-40B4-BE49-F238E27FC236}">
-                <a16:creationId xmlns:a16="http://schemas.microsoft.com/office/drawing/2014/main" id="{54BA0EA4-0209-486C-8A49-D84C4D9AF55C}"/>
-              </a:ext>
-            </a:extLst>
-          </p:cNvPr>
-          <p:cNvPicPr>
-            <a:picLocks noChangeAspect="1"/>
-          </p:cNvPicPr>
-          <p:nvPr/>
-        </p:nvPicPr>
-        <p:blipFill>
-          <a:blip r:embed="rId3"/>
-          <a:stretch>
-            <a:fillRect/>
-          </a:stretch>
-        </p:blipFill>
-        <p:spPr>
-          <a:xfrm>
-            <a:off x="6728036" y="2770456"/>
-            <a:ext cx="538370" cy="402443"/>
-          </a:xfrm>
-          <a:prstGeom prst="rect">
-            <a:avLst/>
-          </a:prstGeom>
-        </p:spPr>
-      </p:pic>
       <p:sp>
         <p:nvSpPr>
           <p:cNvPr id="108" name="TextBox 107">
             <a:extLst>
               <a:ext uri="{FF2B5EF4-FFF2-40B4-BE49-F238E27FC236}">
-                <a16:creationId xmlns:a16="http://schemas.microsoft.com/office/drawing/2014/main" id="{C9CC0109-A659-4BF6-A982-DA7FC5480E26}"/>
+                <a16:creationId xmlns:a16="http://schemas.microsoft.com/office/drawing/2014/main" xmlns="" id="{C9CC0109-A659-4BF6-A982-DA7FC5480E26}"/>
               </a:ext>
             </a:extLst>
           </p:cNvPr>
@@ -4625,7 +4238,7 @@
         </p:nvSpPr>
         <p:spPr>
           <a:xfrm>
-            <a:off x="7251458" y="2673130"/>
+            <a:off x="7201012" y="2801734"/>
             <a:ext cx="997617" cy="584775"/>
           </a:xfrm>
           <a:prstGeom prst="rect">
@@ -4663,7 +4276,7 @@
           <p:cNvPr id="109" name="TextBox 108">
             <a:extLst>
               <a:ext uri="{FF2B5EF4-FFF2-40B4-BE49-F238E27FC236}">
-                <a16:creationId xmlns:a16="http://schemas.microsoft.com/office/drawing/2014/main" id="{4B3F3317-EDC7-4B69-B39F-45583B9C6E24}"/>
+                <a16:creationId xmlns:a16="http://schemas.microsoft.com/office/drawing/2014/main" xmlns="" id="{4B3F3317-EDC7-4B69-B39F-45583B9C6E24}"/>
               </a:ext>
             </a:extLst>
           </p:cNvPr>
@@ -4672,8 +4285,8 @@
         </p:nvSpPr>
         <p:spPr>
           <a:xfrm>
-            <a:off x="3024078" y="3369357"/>
-            <a:ext cx="1321456" cy="461665"/>
+            <a:off x="2335286" y="3497199"/>
+            <a:ext cx="1582008" cy="523220"/>
           </a:xfrm>
           <a:prstGeom prst="rect">
             <a:avLst/>
@@ -4687,13 +4300,13 @@
           <a:lstStyle/>
           <a:p>
             <a:r>
-              <a:rPr lang="en-US" sz="1200" dirty="0"/>
+              <a:rPr lang="en-US" sz="1400" dirty="0"/>
               <a:t>Public Subnet #2</a:t>
             </a:r>
           </a:p>
           <a:p>
             <a:r>
-              <a:rPr lang="en-US" sz="1200" dirty="0"/>
+              <a:rPr lang="en-US" sz="1400" dirty="0"/>
               <a:t>10.1.1.0/24</a:t>
             </a:r>
           </a:p>
@@ -4704,7 +4317,7 @@
           <p:cNvPr id="110" name="Rectangle: Rounded Corners 109">
             <a:extLst>
               <a:ext uri="{FF2B5EF4-FFF2-40B4-BE49-F238E27FC236}">
-                <a16:creationId xmlns:a16="http://schemas.microsoft.com/office/drawing/2014/main" id="{EDEA7E3F-1224-4450-A937-55624C927BD1}"/>
+                <a16:creationId xmlns:a16="http://schemas.microsoft.com/office/drawing/2014/main" xmlns="" id="{EDEA7E3F-1224-4450-A937-55624C927BD1}"/>
               </a:ext>
             </a:extLst>
           </p:cNvPr>
@@ -4713,8 +4326,8 @@
         </p:nvSpPr>
         <p:spPr>
           <a:xfrm>
-            <a:off x="2832692" y="3801699"/>
-            <a:ext cx="1473321" cy="560040"/>
+            <a:off x="2566710" y="3993031"/>
+            <a:ext cx="1739304" cy="618839"/>
           </a:xfrm>
           <a:prstGeom prst="roundRect">
             <a:avLst/>
@@ -4752,42 +4365,12 @@
           </a:p>
         </p:txBody>
       </p:sp>
-      <p:pic>
-        <p:nvPicPr>
-          <p:cNvPr id="111" name="Picture 110">
-            <a:extLst>
-              <a:ext uri="{FF2B5EF4-FFF2-40B4-BE49-F238E27FC236}">
-                <a16:creationId xmlns:a16="http://schemas.microsoft.com/office/drawing/2014/main" id="{9D8FB42E-F96F-4A3F-A722-37A1515CBF04}"/>
-              </a:ext>
-            </a:extLst>
-          </p:cNvPr>
-          <p:cNvPicPr>
-            <a:picLocks noChangeAspect="1"/>
-          </p:cNvPicPr>
-          <p:nvPr/>
-        </p:nvPicPr>
-        <p:blipFill>
-          <a:blip r:embed="rId3"/>
-          <a:stretch>
-            <a:fillRect/>
-          </a:stretch>
-        </p:blipFill>
-        <p:spPr>
-          <a:xfrm>
-            <a:off x="2928857" y="3874674"/>
-            <a:ext cx="538370" cy="402443"/>
-          </a:xfrm>
-          <a:prstGeom prst="rect">
-            <a:avLst/>
-          </a:prstGeom>
-        </p:spPr>
-      </p:pic>
       <p:sp>
         <p:nvSpPr>
           <p:cNvPr id="112" name="TextBox 111">
             <a:extLst>
               <a:ext uri="{FF2B5EF4-FFF2-40B4-BE49-F238E27FC236}">
-                <a16:creationId xmlns:a16="http://schemas.microsoft.com/office/drawing/2014/main" id="{AA4D7997-BEE0-4484-81BE-E45ED599FD1B}"/>
+                <a16:creationId xmlns:a16="http://schemas.microsoft.com/office/drawing/2014/main" xmlns="" id="{AA4D7997-BEE0-4484-81BE-E45ED599FD1B}"/>
               </a:ext>
             </a:extLst>
           </p:cNvPr>
@@ -4796,7 +4379,7 @@
         </p:nvSpPr>
         <p:spPr>
           <a:xfrm>
-            <a:off x="3452279" y="3760570"/>
+            <a:off x="2752201" y="3970602"/>
             <a:ext cx="997617" cy="769441"/>
           </a:xfrm>
           <a:prstGeom prst="rect">
@@ -4810,59 +4393,62 @@
           </a:bodyPr>
           <a:lstStyle/>
           <a:p>
+            <a:pPr algn="r"/>
             <a:r>
               <a:rPr lang="en-US" sz="1200" dirty="0"/>
               <a:t>Aviatrix</a:t>
             </a:r>
           </a:p>
           <a:p>
+            <a:pPr algn="r"/>
             <a:r>
               <a:rPr lang="en-US" sz="1200" dirty="0"/>
               <a:t>VPN GW #1</a:t>
             </a:r>
           </a:p>
           <a:p>
+            <a:pPr algn="r"/>
             <a:r>
               <a:rPr lang="en-US" sz="800" dirty="0"/>
               <a:t>(vpc-01-avx-vpn)</a:t>
             </a:r>
           </a:p>
           <a:p>
+            <a:pPr algn="r"/>
             <a:endParaRPr lang="en-US" sz="1200" dirty="0"/>
           </a:p>
         </p:txBody>
       </p:sp>
       <p:cxnSp>
         <p:nvCxnSpPr>
-          <p:cNvPr id="118" name="Straight Connector 117">
-            <a:extLst>
-              <a:ext uri="{FF2B5EF4-FFF2-40B4-BE49-F238E27FC236}">
-                <a16:creationId xmlns:a16="http://schemas.microsoft.com/office/drawing/2014/main" id="{248AFA76-0311-4BD0-BD95-A304F40E383A}"/>
+          <p:cNvPr id="48" name="Connector: Elbow 47">
+            <a:extLst>
+              <a:ext uri="{FF2B5EF4-FFF2-40B4-BE49-F238E27FC236}">
+                <a16:creationId xmlns:a16="http://schemas.microsoft.com/office/drawing/2014/main" xmlns="" id="{8D1F5CAB-60C0-4A74-9401-AD6EFE83BFA1}"/>
               </a:ext>
             </a:extLst>
           </p:cNvPr>
           <p:cNvCxnSpPr>
             <a:cxnSpLocks/>
-            <a:stCxn id="119" idx="2"/>
           </p:cNvCxnSpPr>
           <p:nvPr/>
         </p:nvCxnSpPr>
         <p:spPr>
-          <a:xfrm>
-            <a:off x="1436490" y="1361058"/>
-            <a:ext cx="1475627" cy="2850215"/>
-          </a:xfrm>
-          <a:prstGeom prst="line">
+          <a:xfrm flipH="1" flipV="1">
+            <a:off x="3945849" y="3266136"/>
+            <a:ext cx="7343" cy="779380"/>
+          </a:xfrm>
+          <a:prstGeom prst="straightConnector1">
             <a:avLst/>
           </a:prstGeom>
-          <a:ln w="28575">
+          <a:ln w="25400">
             <a:solidFill>
               <a:schemeClr val="accent1">
-                <a:lumMod val="20000"/>
-                <a:lumOff val="80000"/>
+                <a:lumMod val="75000"/>
               </a:schemeClr>
             </a:solidFill>
-            <a:prstDash val="dash"/>
+            <a:headEnd type="none"/>
+            <a:tailEnd type="triangle"/>
           </a:ln>
         </p:spPr>
         <p:style>
@@ -4882,10 +4468,104 @@
       </p:cxnSp>
       <p:sp>
         <p:nvSpPr>
-          <p:cNvPr id="121" name="TextBox 120">
-            <a:extLst>
-              <a:ext uri="{FF2B5EF4-FFF2-40B4-BE49-F238E27FC236}">
-                <a16:creationId xmlns:a16="http://schemas.microsoft.com/office/drawing/2014/main" id="{FFE1D558-2B02-4A7A-8F24-006F2C842210}"/>
+          <p:cNvPr id="138" name="Rectangle 137">
+            <a:extLst>
+              <a:ext uri="{FF2B5EF4-FFF2-40B4-BE49-F238E27FC236}">
+                <a16:creationId xmlns:a16="http://schemas.microsoft.com/office/drawing/2014/main" xmlns="" id="{8C02DC0C-1E3B-405E-B543-4A7A97307821}"/>
+              </a:ext>
+            </a:extLst>
+          </p:cNvPr>
+          <p:cNvSpPr/>
+          <p:nvPr/>
+        </p:nvSpPr>
+        <p:spPr>
+          <a:xfrm>
+            <a:off x="3611971" y="3663682"/>
+            <a:ext cx="732316" cy="246221"/>
+          </a:xfrm>
+          <a:prstGeom prst="rect">
+            <a:avLst/>
+          </a:prstGeom>
+        </p:spPr>
+        <p:txBody>
+          <a:bodyPr vert="horz" wrap="square">
+            <a:spAutoFit/>
+          </a:bodyPr>
+          <a:lstStyle/>
+          <a:p>
+            <a:r>
+              <a:rPr lang="en-US" sz="1000" smtClean="0">
+                <a:solidFill>
+                  <a:schemeClr val="accent1">
+                    <a:lumMod val="75000"/>
+                  </a:schemeClr>
+                </a:solidFill>
+              </a:rPr>
+              <a:t>PBR</a:t>
+            </a:r>
+            <a:endParaRPr lang="en-US" sz="1000" dirty="0">
+              <a:solidFill>
+                <a:schemeClr val="accent1">
+                  <a:lumMod val="75000"/>
+                </a:schemeClr>
+              </a:solidFill>
+            </a:endParaRPr>
+          </a:p>
+        </p:txBody>
+      </p:sp>
+      <p:cxnSp>
+        <p:nvCxnSpPr>
+          <p:cNvPr id="139" name="Connector: Elbow 47">
+            <a:extLst>
+              <a:ext uri="{FF2B5EF4-FFF2-40B4-BE49-F238E27FC236}">
+                <a16:creationId xmlns:a16="http://schemas.microsoft.com/office/drawing/2014/main" xmlns="" id="{8C9C3AFD-60BA-4299-B0F4-47644A5B2983}"/>
+              </a:ext>
+            </a:extLst>
+          </p:cNvPr>
+          <p:cNvCxnSpPr>
+            <a:cxnSpLocks/>
+          </p:cNvCxnSpPr>
+          <p:nvPr/>
+        </p:nvCxnSpPr>
+        <p:spPr>
+          <a:xfrm flipV="1">
+            <a:off x="9117371" y="5139149"/>
+            <a:ext cx="1283627" cy="1"/>
+          </a:xfrm>
+          <a:prstGeom prst="straightConnector1">
+            <a:avLst/>
+          </a:prstGeom>
+          <a:ln w="25400">
+            <a:solidFill>
+              <a:schemeClr val="accent1">
+                <a:lumMod val="75000"/>
+              </a:schemeClr>
+            </a:solidFill>
+            <a:headEnd type="none"/>
+            <a:tailEnd type="triangle"/>
+          </a:ln>
+        </p:spPr>
+        <p:style>
+          <a:lnRef idx="1">
+            <a:schemeClr val="accent1"/>
+          </a:lnRef>
+          <a:fillRef idx="0">
+            <a:schemeClr val="accent1"/>
+          </a:fillRef>
+          <a:effectRef idx="0">
+            <a:schemeClr val="accent1"/>
+          </a:effectRef>
+          <a:fontRef idx="minor">
+            <a:schemeClr val="tx1"/>
+          </a:fontRef>
+        </p:style>
+      </p:cxnSp>
+      <p:sp>
+        <p:nvSpPr>
+          <p:cNvPr id="143" name="TextBox 142">
+            <a:extLst>
+              <a:ext uri="{FF2B5EF4-FFF2-40B4-BE49-F238E27FC236}">
+                <a16:creationId xmlns:a16="http://schemas.microsoft.com/office/drawing/2014/main" xmlns="" id="{FFCBCAC0-D736-4644-B96E-F68EFEB94D1B}"/>
               </a:ext>
             </a:extLst>
           </p:cNvPr>
@@ -4894,8 +4574,8 @@
         </p:nvSpPr>
         <p:spPr>
           <a:xfrm>
-            <a:off x="2868149" y="5229013"/>
-            <a:ext cx="875176" cy="276999"/>
+            <a:off x="9008983" y="4876030"/>
+            <a:ext cx="1506193" cy="276999"/>
           </a:xfrm>
           <a:prstGeom prst="rect">
             <a:avLst/>
@@ -4908,39 +4588,242 @@
           </a:bodyPr>
           <a:lstStyle/>
           <a:p>
+            <a:pPr algn="ctr"/>
             <a:r>
               <a:rPr lang="en-US" sz="1200" dirty="0"/>
-              <a:t>VPN Client</a:t>
-            </a:r>
-          </a:p>
-        </p:txBody>
-      </p:sp>
-      <p:sp>
-        <p:nvSpPr>
-          <p:cNvPr id="36" name="Thought Bubble: Cloud 35">
-            <a:extLst>
-              <a:ext uri="{FF2B5EF4-FFF2-40B4-BE49-F238E27FC236}">
-                <a16:creationId xmlns:a16="http://schemas.microsoft.com/office/drawing/2014/main" id="{91AEC731-245F-42D9-AD73-E4A6A4E22403}"/>
-              </a:ext>
-            </a:extLst>
-          </p:cNvPr>
+              <a:t>PBR</a:t>
+            </a:r>
+          </a:p>
+        </p:txBody>
+      </p:sp>
+      <p:cxnSp>
+        <p:nvCxnSpPr>
+          <p:cNvPr id="192" name="Straight Arrow Connector 191">
+            <a:extLst>
+              <a:ext uri="{FF2B5EF4-FFF2-40B4-BE49-F238E27FC236}">
+                <a16:creationId xmlns:a16="http://schemas.microsoft.com/office/drawing/2014/main" xmlns="" id="{C158BC43-E3F6-402C-9679-BDD5FCF616B5}"/>
+              </a:ext>
+            </a:extLst>
+          </p:cNvPr>
+          <p:cNvCxnSpPr>
+            <a:cxnSpLocks/>
+          </p:cNvCxnSpPr>
+          <p:nvPr/>
+        </p:nvCxnSpPr>
+        <p:spPr>
+          <a:xfrm>
+            <a:off x="9117371" y="5527020"/>
+            <a:ext cx="1283627" cy="0"/>
+          </a:xfrm>
+          <a:prstGeom prst="straightConnector1">
+            <a:avLst/>
+          </a:prstGeom>
+          <a:ln w="19050">
+            <a:solidFill>
+              <a:srgbClr val="FFC000"/>
+            </a:solidFill>
+            <a:tailEnd type="triangle"/>
+          </a:ln>
+        </p:spPr>
+        <p:style>
+          <a:lnRef idx="1">
+            <a:schemeClr val="accent1"/>
+          </a:lnRef>
+          <a:fillRef idx="0">
+            <a:schemeClr val="accent1"/>
+          </a:fillRef>
+          <a:effectRef idx="0">
+            <a:schemeClr val="accent1"/>
+          </a:effectRef>
+          <a:fontRef idx="minor">
+            <a:schemeClr val="tx1"/>
+          </a:fontRef>
+        </p:style>
+      </p:cxnSp>
+      <p:sp>
+        <p:nvSpPr>
+          <p:cNvPr id="193" name="TextBox 192">
+            <a:extLst>
+              <a:ext uri="{FF2B5EF4-FFF2-40B4-BE49-F238E27FC236}">
+                <a16:creationId xmlns:a16="http://schemas.microsoft.com/office/drawing/2014/main" xmlns="" id="{DBF0FB52-90B3-4CED-96BF-28B94CA3ADEE}"/>
+              </a:ext>
+            </a:extLst>
+          </p:cNvPr>
+          <p:cNvSpPr txBox="1"/>
+          <p:nvPr/>
+        </p:nvSpPr>
+        <p:spPr>
+          <a:xfrm>
+            <a:off x="9008983" y="5265955"/>
+            <a:ext cx="1506193" cy="276999"/>
+          </a:xfrm>
+          <a:prstGeom prst="rect">
+            <a:avLst/>
+          </a:prstGeom>
+          <a:noFill/>
+        </p:spPr>
+        <p:txBody>
+          <a:bodyPr wrap="square" rtlCol="0">
+            <a:spAutoFit/>
+          </a:bodyPr>
+          <a:lstStyle/>
+          <a:p>
+            <a:pPr algn="ctr"/>
+            <a:r>
+              <a:rPr lang="en-US" sz="1200" dirty="0"/>
+              <a:t>Traffic Flow</a:t>
+            </a:r>
+          </a:p>
+        </p:txBody>
+      </p:sp>
+      <p:pic>
+        <p:nvPicPr>
+          <p:cNvPr id="50" name="Picture 49"/>
+          <p:cNvPicPr>
+            <a:picLocks noChangeAspect="1"/>
+          </p:cNvPicPr>
+          <p:nvPr/>
+        </p:nvPicPr>
+        <p:blipFill>
+          <a:blip r:embed="rId2">
+            <a:extLst>
+              <a:ext uri="{28A0092B-C50C-407E-A947-70E740481C1C}">
+                <a14:useLocalDpi xmlns:a14="http://schemas.microsoft.com/office/drawing/2010/main" val="0"/>
+              </a:ext>
+            </a:extLst>
+          </a:blip>
+          <a:stretch>
+            <a:fillRect/>
+          </a:stretch>
+        </p:blipFill>
+        <p:spPr>
+          <a:xfrm>
+            <a:off x="2285796" y="1720892"/>
+            <a:ext cx="526962" cy="343989"/>
+          </a:xfrm>
+          <a:prstGeom prst="rect">
+            <a:avLst/>
+          </a:prstGeom>
+        </p:spPr>
+      </p:pic>
+      <p:pic>
+        <p:nvPicPr>
+          <p:cNvPr id="51" name="Picture 50"/>
+          <p:cNvPicPr>
+            <a:picLocks noChangeAspect="1"/>
+          </p:cNvPicPr>
+          <p:nvPr/>
+        </p:nvPicPr>
+        <p:blipFill>
+          <a:blip r:embed="rId2">
+            <a:extLst>
+              <a:ext uri="{28A0092B-C50C-407E-A947-70E740481C1C}">
+                <a14:useLocalDpi xmlns:a14="http://schemas.microsoft.com/office/drawing/2010/main" val="0"/>
+              </a:ext>
+            </a:extLst>
+          </a:blip>
+          <a:stretch>
+            <a:fillRect/>
+          </a:stretch>
+        </p:blipFill>
+        <p:spPr>
+          <a:xfrm>
+            <a:off x="6148045" y="1754499"/>
+            <a:ext cx="526962" cy="343989"/>
+          </a:xfrm>
+          <a:prstGeom prst="rect">
+            <a:avLst/>
+          </a:prstGeom>
+        </p:spPr>
+      </p:pic>
+      <p:pic>
+        <p:nvPicPr>
+          <p:cNvPr id="52" name="Picture 51"/>
+          <p:cNvPicPr>
+            <a:picLocks noChangeAspect="1"/>
+          </p:cNvPicPr>
+          <p:nvPr/>
+        </p:nvPicPr>
+        <p:blipFill>
+          <a:blip r:embed="rId2">
+            <a:extLst>
+              <a:ext uri="{28A0092B-C50C-407E-A947-70E740481C1C}">
+                <a14:useLocalDpi xmlns:a14="http://schemas.microsoft.com/office/drawing/2010/main" val="0"/>
+              </a:ext>
+            </a:extLst>
+          </a:blip>
+          <a:stretch>
+            <a:fillRect/>
+          </a:stretch>
+        </p:blipFill>
+        <p:spPr>
+          <a:xfrm>
+            <a:off x="7738079" y="3553166"/>
+            <a:ext cx="526962" cy="343989"/>
+          </a:xfrm>
+          <a:prstGeom prst="rect">
+            <a:avLst/>
+          </a:prstGeom>
+        </p:spPr>
+      </p:pic>
+      <p:sp>
+        <p:nvSpPr>
+          <p:cNvPr id="53" name="TextBox 52">
+            <a:extLst>
+              <a:ext uri="{FF2B5EF4-FFF2-40B4-BE49-F238E27FC236}">
+                <a16:creationId xmlns:a16="http://schemas.microsoft.com/office/drawing/2014/main" xmlns="" id="{AF029AF3-4547-492D-9E11-CC5633A17967}"/>
+              </a:ext>
+            </a:extLst>
+          </p:cNvPr>
+          <p:cNvSpPr txBox="1"/>
+          <p:nvPr/>
+        </p:nvSpPr>
+        <p:spPr>
+          <a:xfrm>
+            <a:off x="6323452" y="4833334"/>
+            <a:ext cx="1525922" cy="461665"/>
+          </a:xfrm>
+          <a:prstGeom prst="rect">
+            <a:avLst/>
+          </a:prstGeom>
+          <a:noFill/>
+        </p:spPr>
+        <p:txBody>
+          <a:bodyPr wrap="square" rtlCol="0">
+            <a:spAutoFit/>
+          </a:bodyPr>
+          <a:lstStyle/>
+          <a:p>
+            <a:r>
+              <a:rPr lang="en-US" sz="1200" b="1" dirty="0" smtClean="0"/>
+              <a:t>Management VPC (any region)</a:t>
+            </a:r>
+            <a:endParaRPr lang="en-US" sz="1200" b="1" dirty="0"/>
+          </a:p>
+        </p:txBody>
+      </p:sp>
+      <p:sp>
+        <p:nvSpPr>
+          <p:cNvPr id="14" name="Cloud 13"/>
           <p:cNvSpPr/>
           <p:nvPr/>
         </p:nvSpPr>
         <p:spPr>
           <a:xfrm>
-            <a:off x="8249075" y="552437"/>
-            <a:ext cx="2461845" cy="936391"/>
-          </a:xfrm>
-          <a:prstGeom prst="cloudCallout">
+            <a:off x="8579316" y="1324669"/>
+            <a:ext cx="1569459" cy="1136434"/>
+          </a:xfrm>
+          <a:prstGeom prst="cloud">
             <a:avLst/>
           </a:prstGeom>
           <a:solidFill>
-            <a:schemeClr val="accent1">
-              <a:lumMod val="20000"/>
-              <a:lumOff val="80000"/>
+            <a:schemeClr val="bg2">
+              <a:lumMod val="75000"/>
             </a:schemeClr>
           </a:solidFill>
+          <a:ln>
+            <a:noFill/>
+          </a:ln>
         </p:spPr>
         <p:style>
           <a:lnRef idx="2">
@@ -4964,45 +4847,139 @@
           <a:p>
             <a:pPr algn="ctr"/>
             <a:r>
-              <a:rPr lang="en-US" dirty="0">
-                <a:solidFill>
-                  <a:schemeClr val="tx2"/>
-                </a:solidFill>
-              </a:rPr>
-              <a:t>Public Network</a:t>
-            </a:r>
-          </a:p>
-        </p:txBody>
-      </p:sp>
-      <p:cxnSp>
-        <p:nvCxnSpPr>
-          <p:cNvPr id="48" name="Connector: Elbow 47">
-            <a:extLst>
-              <a:ext uri="{FF2B5EF4-FFF2-40B4-BE49-F238E27FC236}">
-                <a16:creationId xmlns:a16="http://schemas.microsoft.com/office/drawing/2014/main" id="{8D1F5CAB-60C0-4A74-9401-AD6EFE83BFA1}"/>
-              </a:ext>
-            </a:extLst>
-          </p:cNvPr>
-          <p:cNvCxnSpPr>
-            <a:cxnSpLocks/>
-          </p:cNvCxnSpPr>
+              <a:rPr lang="en-US" smtClean="0"/>
+              <a:t>Internet</a:t>
+            </a:r>
+            <a:endParaRPr lang="en-US"/>
+          </a:p>
+        </p:txBody>
+      </p:sp>
+      <p:pic>
+        <p:nvPicPr>
+          <p:cNvPr id="69" name="Picture 68" descr="Client.png"/>
+          <p:cNvPicPr>
+            <a:picLocks noChangeAspect="1"/>
+          </p:cNvPicPr>
           <p:nvPr/>
-        </p:nvCxnSpPr>
-        <p:spPr>
-          <a:xfrm flipV="1">
-            <a:off x="3066917" y="3282267"/>
-            <a:ext cx="127" cy="463697"/>
-          </a:xfrm>
-          <a:prstGeom prst="straightConnector1">
+        </p:nvPicPr>
+        <p:blipFill>
+          <a:blip r:embed="rId3">
+            <a:extLst>
+              <a:ext uri="{28A0092B-C50C-407E-A947-70E740481C1C}">
+                <a14:useLocalDpi xmlns:a14="http://schemas.microsoft.com/office/drawing/2010/main" val="0"/>
+              </a:ext>
+            </a:extLst>
+          </a:blip>
+          <a:stretch>
+            <a:fillRect/>
+          </a:stretch>
+        </p:blipFill>
+        <p:spPr>
+          <a:xfrm>
+            <a:off x="3656750" y="5381311"/>
+            <a:ext cx="630149" cy="630149"/>
+          </a:xfrm>
+          <a:prstGeom prst="rect">
             <a:avLst/>
           </a:prstGeom>
-          <a:ln w="25400">
+        </p:spPr>
+      </p:pic>
+      <p:sp>
+        <p:nvSpPr>
+          <p:cNvPr id="32" name="Freeform 31"/>
+          <p:cNvSpPr/>
+          <p:nvPr/>
+        </p:nvSpPr>
+        <p:spPr>
+          <a:xfrm>
+            <a:off x="4079996" y="2400300"/>
+            <a:ext cx="4860804" cy="2984500"/>
+          </a:xfrm>
+          <a:custGeom>
+            <a:avLst/>
+            <a:gdLst>
+              <a:gd name="connsiteX0" fmla="*/ 34804 w 4860804"/>
+              <a:gd name="connsiteY0" fmla="*/ 2984500 h 2984500"/>
+              <a:gd name="connsiteX1" fmla="*/ 9404 w 4860804"/>
+              <a:gd name="connsiteY1" fmla="*/ 1003300 h 2984500"/>
+              <a:gd name="connsiteX2" fmla="*/ 174504 w 4860804"/>
+              <a:gd name="connsiteY2" fmla="*/ 482600 h 2984500"/>
+              <a:gd name="connsiteX3" fmla="*/ 758704 w 4860804"/>
+              <a:gd name="connsiteY3" fmla="*/ 419100 h 2984500"/>
+              <a:gd name="connsiteX4" fmla="*/ 2689104 w 4860804"/>
+              <a:gd name="connsiteY4" fmla="*/ 419100 h 2984500"/>
+              <a:gd name="connsiteX5" fmla="*/ 3908304 w 4860804"/>
+              <a:gd name="connsiteY5" fmla="*/ 419100 h 2984500"/>
+              <a:gd name="connsiteX6" fmla="*/ 4860804 w 4860804"/>
+              <a:gd name="connsiteY6" fmla="*/ 0 h 2984500"/>
+            </a:gdLst>
+            <a:ahLst/>
+            <a:cxnLst>
+              <a:cxn ang="0">
+                <a:pos x="connsiteX0" y="connsiteY0"/>
+              </a:cxn>
+              <a:cxn ang="0">
+                <a:pos x="connsiteX1" y="connsiteY1"/>
+              </a:cxn>
+              <a:cxn ang="0">
+                <a:pos x="connsiteX2" y="connsiteY2"/>
+              </a:cxn>
+              <a:cxn ang="0">
+                <a:pos x="connsiteX3" y="connsiteY3"/>
+              </a:cxn>
+              <a:cxn ang="0">
+                <a:pos x="connsiteX4" y="connsiteY4"/>
+              </a:cxn>
+              <a:cxn ang="0">
+                <a:pos x="connsiteX5" y="connsiteY5"/>
+              </a:cxn>
+              <a:cxn ang="0">
+                <a:pos x="connsiteX6" y="connsiteY6"/>
+              </a:cxn>
+            </a:cxnLst>
+            <a:rect l="l" t="t" r="r" b="b"/>
+            <a:pathLst>
+              <a:path w="4860804" h="2984500">
+                <a:moveTo>
+                  <a:pt x="34804" y="2984500"/>
+                </a:moveTo>
+                <a:cubicBezTo>
+                  <a:pt x="10462" y="2202391"/>
+                  <a:pt x="-13879" y="1420283"/>
+                  <a:pt x="9404" y="1003300"/>
+                </a:cubicBezTo>
+                <a:cubicBezTo>
+                  <a:pt x="32687" y="586317"/>
+                  <a:pt x="49621" y="579967"/>
+                  <a:pt x="174504" y="482600"/>
+                </a:cubicBezTo>
+                <a:cubicBezTo>
+                  <a:pt x="299387" y="385233"/>
+                  <a:pt x="339604" y="429683"/>
+                  <a:pt x="758704" y="419100"/>
+                </a:cubicBezTo>
+                <a:cubicBezTo>
+                  <a:pt x="1177804" y="408517"/>
+                  <a:pt x="2689104" y="419100"/>
+                  <a:pt x="2689104" y="419100"/>
+                </a:cubicBezTo>
+                <a:cubicBezTo>
+                  <a:pt x="3214037" y="419100"/>
+                  <a:pt x="3546354" y="488950"/>
+                  <a:pt x="3908304" y="419100"/>
+                </a:cubicBezTo>
+                <a:cubicBezTo>
+                  <a:pt x="4270254" y="349250"/>
+                  <a:pt x="4860804" y="0"/>
+                  <a:pt x="4860804" y="0"/>
+                </a:cubicBezTo>
+              </a:path>
+            </a:pathLst>
+          </a:custGeom>
+          <a:ln w="19050">
             <a:solidFill>
-              <a:schemeClr val="accent1">
-                <a:lumMod val="75000"/>
-              </a:schemeClr>
+              <a:srgbClr val="FFC000"/>
             </a:solidFill>
-            <a:headEnd type="none"/>
             <a:tailEnd type="triangle"/>
           </a:ln>
         </p:spPr>
@@ -5020,155 +4997,201 @@
             <a:schemeClr val="tx1"/>
           </a:fontRef>
         </p:style>
-      </p:cxnSp>
-      <p:sp>
-        <p:nvSpPr>
-          <p:cNvPr id="138" name="Rectangle 137">
-            <a:extLst>
-              <a:ext uri="{FF2B5EF4-FFF2-40B4-BE49-F238E27FC236}">
-                <a16:creationId xmlns:a16="http://schemas.microsoft.com/office/drawing/2014/main" id="{8C02DC0C-1E3B-405E-B543-4A7A97307821}"/>
-              </a:ext>
-            </a:extLst>
-          </p:cNvPr>
-          <p:cNvSpPr/>
+        <p:txBody>
+          <a:bodyPr rtlCol="0" anchor="ctr"/>
+          <a:lstStyle/>
+          <a:p>
+            <a:pPr algn="ctr"/>
+            <a:endParaRPr lang="en-US"/>
+          </a:p>
+        </p:txBody>
+      </p:sp>
+      <p:pic>
+        <p:nvPicPr>
+          <p:cNvPr id="86" name="Picture 85"/>
+          <p:cNvPicPr>
+            <a:picLocks noChangeAspect="1"/>
+          </p:cNvPicPr>
           <p:nvPr/>
-        </p:nvSpPr>
-        <p:spPr>
-          <a:xfrm rot="5400000">
-            <a:off x="2597277" y="3380099"/>
-            <a:ext cx="732316" cy="269483"/>
+        </p:nvPicPr>
+        <p:blipFill>
+          <a:blip r:embed="rId4" cstate="hqprint">
+            <a:extLst>
+              <a:ext uri="{28A0092B-C50C-407E-A947-70E740481C1C}">
+                <a14:useLocalDpi xmlns:a14="http://schemas.microsoft.com/office/drawing/2010/main"/>
+              </a:ext>
+            </a:extLst>
+          </a:blip>
+          <a:stretch>
+            <a:fillRect/>
+          </a:stretch>
+        </p:blipFill>
+        <p:spPr>
+          <a:xfrm>
+            <a:off x="3706620" y="2774980"/>
+            <a:ext cx="478455" cy="478455"/>
           </a:xfrm>
           <a:prstGeom prst="rect">
             <a:avLst/>
           </a:prstGeom>
         </p:spPr>
-        <p:txBody>
-          <a:bodyPr vert="wordArtVert" wrap="square">
-            <a:spAutoFit/>
-          </a:bodyPr>
-          <a:lstStyle/>
-          <a:p>
-            <a:r>
-              <a:rPr lang="en-US" sz="1000" dirty="0">
-                <a:solidFill>
-                  <a:schemeClr val="accent1">
-                    <a:lumMod val="75000"/>
-                  </a:schemeClr>
-                </a:solidFill>
-              </a:rPr>
-              <a:t>PBR</a:t>
-            </a:r>
-          </a:p>
-        </p:txBody>
-      </p:sp>
+        <p:style>
+          <a:lnRef idx="3">
+            <a:schemeClr val="lt1"/>
+          </a:lnRef>
+          <a:fillRef idx="1">
+            <a:schemeClr val="accent2"/>
+          </a:fillRef>
+          <a:effectRef idx="1">
+            <a:schemeClr val="accent2"/>
+          </a:effectRef>
+          <a:fontRef idx="minor">
+            <a:schemeClr val="lt1"/>
+          </a:fontRef>
+        </p:style>
+      </p:pic>
+      <p:pic>
+        <p:nvPicPr>
+          <p:cNvPr id="87" name="Picture 86"/>
+          <p:cNvPicPr>
+            <a:picLocks noChangeAspect="1"/>
+          </p:cNvPicPr>
+          <p:nvPr/>
+        </p:nvPicPr>
+        <p:blipFill>
+          <a:blip r:embed="rId4" cstate="hqprint">
+            <a:extLst>
+              <a:ext uri="{28A0092B-C50C-407E-A947-70E740481C1C}">
+                <a14:useLocalDpi xmlns:a14="http://schemas.microsoft.com/office/drawing/2010/main"/>
+              </a:ext>
+            </a:extLst>
+          </a:blip>
+          <a:stretch>
+            <a:fillRect/>
+          </a:stretch>
+        </p:blipFill>
+        <p:spPr>
+          <a:xfrm>
+            <a:off x="3713964" y="4045516"/>
+            <a:ext cx="478455" cy="478455"/>
+          </a:xfrm>
+          <a:prstGeom prst="rect">
+            <a:avLst/>
+          </a:prstGeom>
+        </p:spPr>
+        <p:style>
+          <a:lnRef idx="3">
+            <a:schemeClr val="lt1"/>
+          </a:lnRef>
+          <a:fillRef idx="1">
+            <a:schemeClr val="accent2"/>
+          </a:fillRef>
+          <a:effectRef idx="1">
+            <a:schemeClr val="accent2"/>
+          </a:effectRef>
+          <a:fontRef idx="minor">
+            <a:schemeClr val="lt1"/>
+          </a:fontRef>
+        </p:style>
+      </p:pic>
+      <p:pic>
+        <p:nvPicPr>
+          <p:cNvPr id="88" name="Picture 87"/>
+          <p:cNvPicPr>
+            <a:picLocks noChangeAspect="1"/>
+          </p:cNvPicPr>
+          <p:nvPr/>
+        </p:nvPicPr>
+        <p:blipFill>
+          <a:blip r:embed="rId4" cstate="hqprint">
+            <a:extLst>
+              <a:ext uri="{28A0092B-C50C-407E-A947-70E740481C1C}">
+                <a14:useLocalDpi xmlns:a14="http://schemas.microsoft.com/office/drawing/2010/main"/>
+              </a:ext>
+            </a:extLst>
+          </a:blip>
+          <a:stretch>
+            <a:fillRect/>
+          </a:stretch>
+        </p:blipFill>
+        <p:spPr>
+          <a:xfrm>
+            <a:off x="6702437" y="2657099"/>
+            <a:ext cx="478455" cy="478455"/>
+          </a:xfrm>
+          <a:prstGeom prst="rect">
+            <a:avLst/>
+          </a:prstGeom>
+        </p:spPr>
+        <p:style>
+          <a:lnRef idx="3">
+            <a:schemeClr val="lt1"/>
+          </a:lnRef>
+          <a:fillRef idx="1">
+            <a:schemeClr val="accent2"/>
+          </a:fillRef>
+          <a:effectRef idx="1">
+            <a:schemeClr val="accent2"/>
+          </a:effectRef>
+          <a:fontRef idx="minor">
+            <a:schemeClr val="lt1"/>
+          </a:fontRef>
+        </p:style>
+      </p:pic>
+      <p:pic>
+        <p:nvPicPr>
+          <p:cNvPr id="91" name="Picture 90"/>
+          <p:cNvPicPr>
+            <a:picLocks noChangeAspect="1"/>
+          </p:cNvPicPr>
+          <p:nvPr/>
+        </p:nvPicPr>
+        <p:blipFill>
+          <a:blip r:embed="rId5" cstate="hqprint">
+            <a:extLst>
+              <a:ext uri="{28A0092B-C50C-407E-A947-70E740481C1C}">
+                <a14:useLocalDpi xmlns:a14="http://schemas.microsoft.com/office/drawing/2010/main"/>
+              </a:ext>
+            </a:extLst>
+          </a:blip>
+          <a:stretch>
+            <a:fillRect/>
+          </a:stretch>
+        </p:blipFill>
+        <p:spPr>
+          <a:xfrm>
+            <a:off x="6693940" y="4011576"/>
+            <a:ext cx="491839" cy="491356"/>
+          </a:xfrm>
+          <a:prstGeom prst="rect">
+            <a:avLst/>
+          </a:prstGeom>
+        </p:spPr>
+      </p:pic>
       <p:cxnSp>
         <p:nvCxnSpPr>
-          <p:cNvPr id="139" name="Connector: Elbow 47">
-            <a:extLst>
-              <a:ext uri="{FF2B5EF4-FFF2-40B4-BE49-F238E27FC236}">
-                <a16:creationId xmlns:a16="http://schemas.microsoft.com/office/drawing/2014/main" id="{8C9C3AFD-60BA-4299-B0F4-47644A5B2983}"/>
-              </a:ext>
-            </a:extLst>
-          </p:cNvPr>
+          <p:cNvPr id="34" name="Straight Connector 33"/>
           <p:cNvCxnSpPr>
-            <a:cxnSpLocks/>
+            <a:stCxn id="91" idx="1"/>
+            <a:endCxn id="87" idx="3"/>
           </p:cNvCxnSpPr>
           <p:nvPr/>
         </p:nvCxnSpPr>
         <p:spPr>
-          <a:xfrm flipV="1">
-            <a:off x="10142048" y="4398864"/>
-            <a:ext cx="1283627" cy="1"/>
-          </a:xfrm>
-          <a:prstGeom prst="straightConnector1">
+          <a:xfrm flipH="1">
+            <a:off x="4192419" y="4257254"/>
+            <a:ext cx="2501521" cy="27490"/>
+          </a:xfrm>
+          <a:prstGeom prst="line">
             <a:avLst/>
           </a:prstGeom>
-          <a:ln w="25400">
+          <a:ln w="19050">
             <a:solidFill>
-              <a:schemeClr val="accent1">
-                <a:lumMod val="75000"/>
+              <a:schemeClr val="bg1">
+                <a:lumMod val="50000"/>
               </a:schemeClr>
             </a:solidFill>
-            <a:headEnd type="none"/>
-            <a:tailEnd type="triangle"/>
-          </a:ln>
-        </p:spPr>
-        <p:style>
-          <a:lnRef idx="1">
-            <a:schemeClr val="accent1"/>
-          </a:lnRef>
-          <a:fillRef idx="0">
-            <a:schemeClr val="accent1"/>
-          </a:fillRef>
-          <a:effectRef idx="0">
-            <a:schemeClr val="accent1"/>
-          </a:effectRef>
-          <a:fontRef idx="minor">
-            <a:schemeClr val="tx1"/>
-          </a:fontRef>
-        </p:style>
-      </p:cxnSp>
-      <p:sp>
-        <p:nvSpPr>
-          <p:cNvPr id="143" name="TextBox 142">
-            <a:extLst>
-              <a:ext uri="{FF2B5EF4-FFF2-40B4-BE49-F238E27FC236}">
-                <a16:creationId xmlns:a16="http://schemas.microsoft.com/office/drawing/2014/main" id="{FFCBCAC0-D736-4644-B96E-F68EFEB94D1B}"/>
-              </a:ext>
-            </a:extLst>
-          </p:cNvPr>
-          <p:cNvSpPr txBox="1"/>
-          <p:nvPr/>
-        </p:nvSpPr>
-        <p:spPr>
-          <a:xfrm>
-            <a:off x="10033660" y="4135745"/>
-            <a:ext cx="1506193" cy="276999"/>
-          </a:xfrm>
-          <a:prstGeom prst="rect">
-            <a:avLst/>
-          </a:prstGeom>
-          <a:noFill/>
-        </p:spPr>
-        <p:txBody>
-          <a:bodyPr wrap="square" rtlCol="0">
-            <a:spAutoFit/>
-          </a:bodyPr>
-          <a:lstStyle/>
-          <a:p>
-            <a:pPr algn="ctr"/>
-            <a:r>
-              <a:rPr lang="en-US" sz="1200" dirty="0"/>
-              <a:t>PBR</a:t>
-            </a:r>
-          </a:p>
-        </p:txBody>
-      </p:sp>
-      <p:cxnSp>
-        <p:nvCxnSpPr>
-          <p:cNvPr id="188" name="Straight Arrow Connector 187">
-            <a:extLst>
-              <a:ext uri="{FF2B5EF4-FFF2-40B4-BE49-F238E27FC236}">
-                <a16:creationId xmlns:a16="http://schemas.microsoft.com/office/drawing/2014/main" id="{7AE3EEA1-45AF-4F9D-AA42-EA094232BB31}"/>
-              </a:ext>
-            </a:extLst>
-          </p:cNvPr>
-          <p:cNvCxnSpPr/>
-          <p:nvPr/>
-        </p:nvCxnSpPr>
-        <p:spPr>
-          <a:xfrm flipV="1">
-            <a:off x="3624163" y="4361739"/>
-            <a:ext cx="0" cy="767638"/>
-          </a:xfrm>
-          <a:prstGeom prst="straightConnector1">
-            <a:avLst/>
-          </a:prstGeom>
-          <a:ln>
-            <a:solidFill>
-              <a:srgbClr val="FFC000"/>
-            </a:solidFill>
-            <a:tailEnd type="triangle"/>
+            <a:prstDash val="dash"/>
           </a:ln>
         </p:spPr>
         <p:style>
@@ -5188,31 +5211,27 @@
       </p:cxnSp>
       <p:cxnSp>
         <p:nvCxnSpPr>
-          <p:cNvPr id="189" name="Straight Arrow Connector 188">
-            <a:extLst>
-              <a:ext uri="{FF2B5EF4-FFF2-40B4-BE49-F238E27FC236}">
-                <a16:creationId xmlns:a16="http://schemas.microsoft.com/office/drawing/2014/main" id="{AE3D1054-F041-4444-8004-D6DFD6AF7034}"/>
-              </a:ext>
-            </a:extLst>
-          </p:cNvPr>
+          <p:cNvPr id="92" name="Straight Connector 91"/>
           <p:cNvCxnSpPr>
-            <a:cxnSpLocks/>
+            <a:stCxn id="91" idx="0"/>
           </p:cNvCxnSpPr>
           <p:nvPr/>
         </p:nvCxnSpPr>
         <p:spPr>
-          <a:xfrm flipV="1">
-            <a:off x="4157493" y="3296248"/>
-            <a:ext cx="0" cy="449716"/>
-          </a:xfrm>
-          <a:prstGeom prst="straightConnector1">
+          <a:xfrm flipH="1" flipV="1">
+            <a:off x="4145589" y="3233157"/>
+            <a:ext cx="2794271" cy="778419"/>
+          </a:xfrm>
+          <a:prstGeom prst="line">
             <a:avLst/>
           </a:prstGeom>
-          <a:ln>
+          <a:ln w="19050">
             <a:solidFill>
-              <a:srgbClr val="FFC000"/>
+              <a:schemeClr val="bg1">
+                <a:lumMod val="50000"/>
+              </a:schemeClr>
             </a:solidFill>
-            <a:tailEnd type="triangle"/>
+            <a:prstDash val="dash"/>
           </a:ln>
         </p:spPr>
         <p:style>
@@ -5232,31 +5251,28 @@
       </p:cxnSp>
       <p:cxnSp>
         <p:nvCxnSpPr>
-          <p:cNvPr id="191" name="Straight Arrow Connector 190">
-            <a:extLst>
-              <a:ext uri="{FF2B5EF4-FFF2-40B4-BE49-F238E27FC236}">
-                <a16:creationId xmlns:a16="http://schemas.microsoft.com/office/drawing/2014/main" id="{E7C0A368-44F0-4FB1-B711-C9B6314B9DA7}"/>
-              </a:ext>
-            </a:extLst>
-          </p:cNvPr>
+          <p:cNvPr id="94" name="Straight Connector 93"/>
           <p:cNvCxnSpPr>
-            <a:cxnSpLocks/>
+            <a:stCxn id="91" idx="0"/>
+            <a:endCxn id="88" idx="2"/>
           </p:cNvCxnSpPr>
           <p:nvPr/>
         </p:nvCxnSpPr>
         <p:spPr>
           <a:xfrm flipV="1">
-            <a:off x="4322753" y="2759154"/>
-            <a:ext cx="2309118" cy="11302"/>
-          </a:xfrm>
-          <a:prstGeom prst="straightConnector1">
+            <a:off x="6939860" y="3135554"/>
+            <a:ext cx="1805" cy="876022"/>
+          </a:xfrm>
+          <a:prstGeom prst="line">
             <a:avLst/>
           </a:prstGeom>
-          <a:ln>
+          <a:ln w="19050">
             <a:solidFill>
-              <a:srgbClr val="FFC000"/>
+              <a:schemeClr val="bg1">
+                <a:lumMod val="50000"/>
+              </a:schemeClr>
             </a:solidFill>
-            <a:tailEnd type="triangle"/>
+            <a:prstDash val="dash"/>
           </a:ln>
         </p:spPr>
         <p:style>
@@ -5274,112 +5290,16 @@
           </a:fontRef>
         </p:style>
       </p:cxnSp>
-      <p:cxnSp>
-        <p:nvCxnSpPr>
-          <p:cNvPr id="133" name="Connector: Elbow 132">
-            <a:extLst>
-              <a:ext uri="{FF2B5EF4-FFF2-40B4-BE49-F238E27FC236}">
-                <a16:creationId xmlns:a16="http://schemas.microsoft.com/office/drawing/2014/main" id="{8A51D4B8-C153-494E-960B-0405126DF549}"/>
-              </a:ext>
-            </a:extLst>
-          </p:cNvPr>
-          <p:cNvCxnSpPr>
-            <a:cxnSpLocks/>
-          </p:cNvCxnSpPr>
-          <p:nvPr/>
-        </p:nvCxnSpPr>
-        <p:spPr>
-          <a:xfrm rot="5400000" flipH="1" flipV="1">
-            <a:off x="8017503" y="1740320"/>
-            <a:ext cx="1117826" cy="942449"/>
-          </a:xfrm>
-          <a:prstGeom prst="bentConnector3">
-            <a:avLst>
-              <a:gd name="adj1" fmla="val 2720"/>
-            </a:avLst>
-          </a:prstGeom>
-          <a:ln>
-            <a:solidFill>
-              <a:srgbClr val="FFC000"/>
-            </a:solidFill>
-            <a:tailEnd type="triangle"/>
-          </a:ln>
-        </p:spPr>
-        <p:style>
-          <a:lnRef idx="1">
-            <a:schemeClr val="accent1"/>
-          </a:lnRef>
-          <a:fillRef idx="0">
-            <a:schemeClr val="accent1"/>
-          </a:fillRef>
-          <a:effectRef idx="0">
-            <a:schemeClr val="accent1"/>
-          </a:effectRef>
-          <a:fontRef idx="minor">
-            <a:schemeClr val="tx1"/>
-          </a:fontRef>
-        </p:style>
-      </p:cxnSp>
-      <p:cxnSp>
-        <p:nvCxnSpPr>
-          <p:cNvPr id="192" name="Straight Arrow Connector 191">
-            <a:extLst>
-              <a:ext uri="{FF2B5EF4-FFF2-40B4-BE49-F238E27FC236}">
-                <a16:creationId xmlns:a16="http://schemas.microsoft.com/office/drawing/2014/main" id="{C158BC43-E3F6-402C-9679-BDD5FCF616B5}"/>
-              </a:ext>
-            </a:extLst>
-          </p:cNvPr>
-          <p:cNvCxnSpPr>
-            <a:cxnSpLocks/>
-          </p:cNvCxnSpPr>
-          <p:nvPr/>
-        </p:nvCxnSpPr>
-        <p:spPr>
-          <a:xfrm>
-            <a:off x="10142048" y="4697835"/>
-            <a:ext cx="1283627" cy="0"/>
-          </a:xfrm>
-          <a:prstGeom prst="straightConnector1">
-            <a:avLst/>
-          </a:prstGeom>
-          <a:ln>
-            <a:solidFill>
-              <a:srgbClr val="FFC000"/>
-            </a:solidFill>
-            <a:tailEnd type="triangle"/>
-          </a:ln>
-        </p:spPr>
-        <p:style>
-          <a:lnRef idx="1">
-            <a:schemeClr val="accent1"/>
-          </a:lnRef>
-          <a:fillRef idx="0">
-            <a:schemeClr val="accent1"/>
-          </a:fillRef>
-          <a:effectRef idx="0">
-            <a:schemeClr val="accent1"/>
-          </a:effectRef>
-          <a:fontRef idx="minor">
-            <a:schemeClr val="tx1"/>
-          </a:fontRef>
-        </p:style>
-      </p:cxnSp>
-      <p:sp>
-        <p:nvSpPr>
-          <p:cNvPr id="193" name="TextBox 192">
-            <a:extLst>
-              <a:ext uri="{FF2B5EF4-FFF2-40B4-BE49-F238E27FC236}">
-                <a16:creationId xmlns:a16="http://schemas.microsoft.com/office/drawing/2014/main" id="{DBF0FB52-90B3-4CED-96BF-28B94CA3ADEE}"/>
-              </a:ext>
-            </a:extLst>
-          </p:cNvPr>
+      <p:sp>
+        <p:nvSpPr>
+          <p:cNvPr id="44" name="TextBox 43"/>
           <p:cNvSpPr txBox="1"/>
           <p:nvPr/>
         </p:nvSpPr>
         <p:spPr>
           <a:xfrm>
-            <a:off x="10033660" y="4436770"/>
-            <a:ext cx="1506193" cy="276999"/>
+            <a:off x="2976120" y="1124689"/>
+            <a:ext cx="905761" cy="338554"/>
           </a:xfrm>
           <a:prstGeom prst="rect">
             <a:avLst/>
@@ -5387,16 +5307,81 @@
           <a:noFill/>
         </p:spPr>
         <p:txBody>
-          <a:bodyPr wrap="square" rtlCol="0">
+          <a:bodyPr wrap="none" rtlCol="0">
             <a:spAutoFit/>
           </a:bodyPr>
           <a:lstStyle/>
           <a:p>
-            <a:pPr algn="ctr"/>
-            <a:r>
-              <a:rPr lang="en-US" sz="1200" dirty="0"/>
-              <a:t>Traffic Flow</a:t>
-            </a:r>
+            <a:r>
+              <a:rPr lang="en-US" sz="1600" smtClean="0"/>
+              <a:t>Region 1</a:t>
+            </a:r>
+            <a:endParaRPr lang="en-US" sz="1600"/>
+          </a:p>
+        </p:txBody>
+      </p:sp>
+      <p:sp>
+        <p:nvSpPr>
+          <p:cNvPr id="101" name="TextBox 100"/>
+          <p:cNvSpPr txBox="1"/>
+          <p:nvPr/>
+        </p:nvSpPr>
+        <p:spPr>
+          <a:xfrm>
+            <a:off x="6627232" y="1124689"/>
+            <a:ext cx="905761" cy="338554"/>
+          </a:xfrm>
+          <a:prstGeom prst="rect">
+            <a:avLst/>
+          </a:prstGeom>
+          <a:noFill/>
+        </p:spPr>
+        <p:txBody>
+          <a:bodyPr wrap="none" rtlCol="0">
+            <a:spAutoFit/>
+          </a:bodyPr>
+          <a:lstStyle/>
+          <a:p>
+            <a:r>
+              <a:rPr lang="en-US" sz="1600" dirty="0" smtClean="0"/>
+              <a:t>Region 2</a:t>
+            </a:r>
+            <a:endParaRPr lang="en-US" sz="1600" dirty="0"/>
+          </a:p>
+        </p:txBody>
+      </p:sp>
+      <p:sp>
+        <p:nvSpPr>
+          <p:cNvPr id="45" name="TextBox 44"/>
+          <p:cNvSpPr txBox="1"/>
+          <p:nvPr/>
+        </p:nvSpPr>
+        <p:spPr>
+          <a:xfrm>
+            <a:off x="2883769" y="5449263"/>
+            <a:ext cx="845296" cy="276999"/>
+          </a:xfrm>
+          <a:prstGeom prst="rect">
+            <a:avLst/>
+          </a:prstGeom>
+          <a:solidFill>
+            <a:schemeClr val="bg1"/>
+          </a:solidFill>
+          <a:ln>
+            <a:noFill/>
+          </a:ln>
+        </p:spPr>
+        <p:txBody>
+          <a:bodyPr wrap="none" rtlCol="0">
+            <a:spAutoFit/>
+          </a:bodyPr>
+          <a:lstStyle/>
+          <a:p>
+            <a:r>
+              <a:rPr lang="en-US" sz="1200" smtClean="0"/>
+              <a:t>VPN Client</a:t>
+            </a:r>
+            <a:endParaRPr lang="en-US" sz="1200"/>
           </a:p>
         </p:txBody>
       </p:sp>

</xml_diff>